<commit_message>
Logic gates and circuits
</commit_message>
<xml_diff>
--- a/02 - Data Representation/slides.pptx
+++ b/02 - Data Representation/slides.pptx
@@ -5,7 +5,7 @@
     <p:sldMasterId id="2147483659" r:id="rId4"/>
   </p:sldMasterIdLst>
   <p:notesMasterIdLst>
-    <p:notesMasterId r:id="rId26"/>
+    <p:notesMasterId r:id="rId27"/>
   </p:notesMasterIdLst>
   <p:sldIdLst>
     <p:sldId id="256" r:id="rId5"/>
@@ -29,23 +29,24 @@
     <p:sldId id="279" r:id="rId23"/>
     <p:sldId id="281" r:id="rId24"/>
     <p:sldId id="283" r:id="rId25"/>
+    <p:sldId id="287" r:id="rId26"/>
   </p:sldIdLst>
   <p:sldSz cx="9144000" cy="6858000" type="screen4x3"/>
   <p:notesSz cx="6858000" cy="9144000"/>
   <p:embeddedFontLst>
     <p:embeddedFont>
       <p:font typeface="Economica" panose="02000506040000020004" pitchFamily="2" charset="77"/>
-      <p:regular r:id="rId27"/>
-      <p:bold r:id="rId28"/>
-      <p:italic r:id="rId29"/>
-      <p:boldItalic r:id="rId30"/>
+      <p:regular r:id="rId28"/>
+      <p:bold r:id="rId29"/>
+      <p:italic r:id="rId30"/>
+      <p:boldItalic r:id="rId31"/>
     </p:embeddedFont>
     <p:embeddedFont>
       <p:font typeface="Open Sans" panose="020B0606030504020204" pitchFamily="34" charset="0"/>
-      <p:regular r:id="rId31"/>
-      <p:bold r:id="rId32"/>
-      <p:italic r:id="rId33"/>
-      <p:boldItalic r:id="rId34"/>
+      <p:regular r:id="rId32"/>
+      <p:bold r:id="rId33"/>
+      <p:italic r:id="rId34"/>
+      <p:boldItalic r:id="rId35"/>
     </p:embeddedFont>
   </p:embeddedFontLst>
   <p:defaultTextStyle>
@@ -291,7 +292,7 @@
 <file path=ppt/revisionInfo.xml><?xml version="1.0" encoding="utf-8"?>
 <p1510:revInfo xmlns:a="http://schemas.openxmlformats.org/drawingml/2006/main" xmlns:r="http://schemas.openxmlformats.org/officeDocument/2006/relationships" xmlns:p1510="http://schemas.microsoft.com/office/powerpoint/2015/10/main">
   <p1510:revLst>
-    <p1510:client id="{34C66404-3638-6042-93D8-3339B953BBFC}" v="83" dt="2025-09-04T06:08:58.393"/>
+    <p1510:client id="{34C66404-3638-6042-93D8-3339B953BBFC}" v="84" dt="2025-09-05T15:08:32.366"/>
   </p1510:revLst>
 </p1510:revInfo>
 </file>
@@ -301,7 +302,7 @@
   <pc:docChgLst>
     <pc:chgData name="Riccardo Berta" userId="c8694f89-bba4-4576-b0a8-456619ca5a8c" providerId="ADAL" clId="{FDDBFC5A-5EA9-5330-BEB8-433D7E3B4C4E}"/>
     <pc:docChg chg="undo redo custSel addSld delSld modSld sldOrd modMainMaster">
-      <pc:chgData name="Riccardo Berta" userId="c8694f89-bba4-4576-b0a8-456619ca5a8c" providerId="ADAL" clId="{FDDBFC5A-5EA9-5330-BEB8-433D7E3B4C4E}" dt="2025-09-04T06:09:03.775" v="2772" actId="14100"/>
+      <pc:chgData name="Riccardo Berta" userId="c8694f89-bba4-4576-b0a8-456619ca5a8c" providerId="ADAL" clId="{FDDBFC5A-5EA9-5330-BEB8-433D7E3B4C4E}" dt="2025-09-05T15:08:44.065" v="2777" actId="122"/>
       <pc:docMkLst>
         <pc:docMk/>
       </pc:docMkLst>
@@ -481,14 +482,6 @@
             <ac:picMk id="2" creationId="{AA04E2F9-A4B5-7E2E-0425-8863373570B1}"/>
           </ac:picMkLst>
         </pc:picChg>
-        <pc:picChg chg="add del mod">
-          <ac:chgData name="Riccardo Berta" userId="c8694f89-bba4-4576-b0a8-456619ca5a8c" providerId="ADAL" clId="{FDDBFC5A-5EA9-5330-BEB8-433D7E3B4C4E}" dt="2025-09-03T07:28:03.577" v="1488" actId="478"/>
-          <ac:picMkLst>
-            <pc:docMk/>
-            <pc:sldMk cId="2644872656" sldId="263"/>
-            <ac:picMk id="3" creationId="{0B4259AE-6E64-922A-4194-E577942DE8FE}"/>
-          </ac:picMkLst>
-        </pc:picChg>
         <pc:picChg chg="add mod">
           <ac:chgData name="Riccardo Berta" userId="c8694f89-bba4-4576-b0a8-456619ca5a8c" providerId="ADAL" clId="{FDDBFC5A-5EA9-5330-BEB8-433D7E3B4C4E}" dt="2025-09-03T07:28:09.468" v="1491" actId="1076"/>
           <ac:picMkLst>
@@ -574,22 +567,6 @@
             <ac:spMk id="84" creationId="{00000000-0000-0000-0000-000000000000}"/>
           </ac:spMkLst>
         </pc:spChg>
-        <pc:picChg chg="add del mod">
-          <ac:chgData name="Riccardo Berta" userId="c8694f89-bba4-4576-b0a8-456619ca5a8c" providerId="ADAL" clId="{FDDBFC5A-5EA9-5330-BEB8-433D7E3B4C4E}" dt="2025-09-03T07:48:25.529" v="1684" actId="478"/>
-          <ac:picMkLst>
-            <pc:docMk/>
-            <pc:sldMk cId="4181844165" sldId="266"/>
-            <ac:picMk id="2" creationId="{AFFF6083-9196-4023-F2CC-421CF389EA05}"/>
-          </ac:picMkLst>
-        </pc:picChg>
-        <pc:picChg chg="add del mod">
-          <ac:chgData name="Riccardo Berta" userId="c8694f89-bba4-4576-b0a8-456619ca5a8c" providerId="ADAL" clId="{FDDBFC5A-5EA9-5330-BEB8-433D7E3B4C4E}" dt="2025-09-03T07:48:41.263" v="1690" actId="478"/>
-          <ac:picMkLst>
-            <pc:docMk/>
-            <pc:sldMk cId="4181844165" sldId="266"/>
-            <ac:picMk id="3" creationId="{9C4BD2E0-F601-7FA5-984A-0378AE31A44F}"/>
-          </ac:picMkLst>
-        </pc:picChg>
         <pc:picChg chg="add mod">
           <ac:chgData name="Riccardo Berta" userId="c8694f89-bba4-4576-b0a8-456619ca5a8c" providerId="ADAL" clId="{FDDBFC5A-5EA9-5330-BEB8-433D7E3B4C4E}" dt="2025-09-03T07:49:10.604" v="1696" actId="1076"/>
           <ac:picMkLst>
@@ -768,22 +745,6 @@
           <pc:docMk/>
           <pc:sldMk cId="993270251" sldId="272"/>
         </pc:sldMkLst>
-        <pc:picChg chg="add mod">
-          <ac:chgData name="Riccardo Berta" userId="c8694f89-bba4-4576-b0a8-456619ca5a8c" providerId="ADAL" clId="{FDDBFC5A-5EA9-5330-BEB8-433D7E3B4C4E}" dt="2025-09-03T06:14:22.642" v="1288" actId="1076"/>
-          <ac:picMkLst>
-            <pc:docMk/>
-            <pc:sldMk cId="993270251" sldId="272"/>
-            <ac:picMk id="2" creationId="{93B8068E-1F6A-EEA6-FCBD-7210FF552504}"/>
-          </ac:picMkLst>
-        </pc:picChg>
-        <pc:picChg chg="del">
-          <ac:chgData name="Riccardo Berta" userId="c8694f89-bba4-4576-b0a8-456619ca5a8c" providerId="ADAL" clId="{FDDBFC5A-5EA9-5330-BEB8-433D7E3B4C4E}" dt="2025-09-03T06:14:19.777" v="1286" actId="478"/>
-          <ac:picMkLst>
-            <pc:docMk/>
-            <pc:sldMk cId="993270251" sldId="272"/>
-            <ac:picMk id="5" creationId="{7227F6A7-57EF-C7FA-5F66-7C49A96758E6}"/>
-          </ac:picMkLst>
-        </pc:picChg>
       </pc:sldChg>
       <pc:sldChg chg="addSp delSp modSp mod">
         <pc:chgData name="Riccardo Berta" userId="c8694f89-bba4-4576-b0a8-456619ca5a8c" providerId="ADAL" clId="{FDDBFC5A-5EA9-5330-BEB8-433D7E3B4C4E}" dt="2025-09-03T08:36:59.023" v="1929" actId="20577"/>
@@ -791,14 +752,6 @@
           <pc:docMk/>
           <pc:sldMk cId="3084049364" sldId="274"/>
         </pc:sldMkLst>
-        <pc:spChg chg="add del">
-          <ac:chgData name="Riccardo Berta" userId="c8694f89-bba4-4576-b0a8-456619ca5a8c" providerId="ADAL" clId="{FDDBFC5A-5EA9-5330-BEB8-433D7E3B4C4E}" dt="2025-09-03T08:34:36.751" v="1883" actId="22"/>
-          <ac:spMkLst>
-            <pc:docMk/>
-            <pc:sldMk cId="3084049364" sldId="274"/>
-            <ac:spMk id="4" creationId="{F52D1BAA-15A8-B6BF-49A9-FEE582CA2560}"/>
-          </ac:spMkLst>
-        </pc:spChg>
         <pc:spChg chg="mod">
           <ac:chgData name="Riccardo Berta" userId="c8694f89-bba4-4576-b0a8-456619ca5a8c" providerId="ADAL" clId="{FDDBFC5A-5EA9-5330-BEB8-433D7E3B4C4E}" dt="2025-09-03T08:36:59.023" v="1929" actId="20577"/>
           <ac:spMkLst>
@@ -838,22 +791,6 @@
           <pc:docMk/>
           <pc:sldMk cId="97697531" sldId="275"/>
         </pc:sldMkLst>
-        <pc:spChg chg="mod">
-          <ac:chgData name="Riccardo Berta" userId="c8694f89-bba4-4576-b0a8-456619ca5a8c" providerId="ADAL" clId="{FDDBFC5A-5EA9-5330-BEB8-433D7E3B4C4E}" dt="2025-09-03T12:39:32.534" v="2760" actId="20577"/>
-          <ac:spMkLst>
-            <pc:docMk/>
-            <pc:sldMk cId="97697531" sldId="275"/>
-            <ac:spMk id="84" creationId="{00000000-0000-0000-0000-000000000000}"/>
-          </ac:spMkLst>
-        </pc:spChg>
-        <pc:picChg chg="add del mod">
-          <ac:chgData name="Riccardo Berta" userId="c8694f89-bba4-4576-b0a8-456619ca5a8c" providerId="ADAL" clId="{FDDBFC5A-5EA9-5330-BEB8-433D7E3B4C4E}" dt="2025-09-03T12:39:43.262" v="2764" actId="478"/>
-          <ac:picMkLst>
-            <pc:docMk/>
-            <pc:sldMk cId="97697531" sldId="275"/>
-            <ac:picMk id="3" creationId="{32DD48E6-EE87-8B2E-DC92-BEE294C686C0}"/>
-          </ac:picMkLst>
-        </pc:picChg>
       </pc:sldChg>
       <pc:sldChg chg="modSp del mod">
         <pc:chgData name="Riccardo Berta" userId="c8694f89-bba4-4576-b0a8-456619ca5a8c" providerId="ADAL" clId="{FDDBFC5A-5EA9-5330-BEB8-433D7E3B4C4E}" dt="2025-09-03T12:49:06.531" v="2766" actId="2696"/>
@@ -861,14 +798,6 @@
           <pc:docMk/>
           <pc:sldMk cId="1483901213" sldId="276"/>
         </pc:sldMkLst>
-        <pc:spChg chg="mod">
-          <ac:chgData name="Riccardo Berta" userId="c8694f89-bba4-4576-b0a8-456619ca5a8c" providerId="ADAL" clId="{FDDBFC5A-5EA9-5330-BEB8-433D7E3B4C4E}" dt="2025-09-03T12:22:57.649" v="2730" actId="20577"/>
-          <ac:spMkLst>
-            <pc:docMk/>
-            <pc:sldMk cId="1483901213" sldId="276"/>
-            <ac:spMk id="84" creationId="{00000000-0000-0000-0000-000000000000}"/>
-          </ac:spMkLst>
-        </pc:spChg>
       </pc:sldChg>
       <pc:sldChg chg="modSp mod">
         <pc:chgData name="Riccardo Berta" userId="c8694f89-bba4-4576-b0a8-456619ca5a8c" providerId="ADAL" clId="{FDDBFC5A-5EA9-5330-BEB8-433D7E3B4C4E}" dt="2025-09-03T10:58:39.273" v="2224" actId="113"/>
@@ -945,28 +874,12 @@
             <ac:picMk id="2" creationId="{F1D7BA78-FAF3-08C1-6006-F53433B1AF62}"/>
           </ac:picMkLst>
         </pc:picChg>
-        <pc:picChg chg="del mod">
-          <ac:chgData name="Riccardo Berta" userId="c8694f89-bba4-4576-b0a8-456619ca5a8c" providerId="ADAL" clId="{FDDBFC5A-5EA9-5330-BEB8-433D7E3B4C4E}" dt="2025-09-03T12:10:21.768" v="2607" actId="478"/>
-          <ac:picMkLst>
-            <pc:docMk/>
-            <pc:sldMk cId="3900298855" sldId="281"/>
-            <ac:picMk id="3" creationId="{7929494A-B061-9B40-C053-3A1344C77BBE}"/>
-          </ac:picMkLst>
-        </pc:picChg>
         <pc:picChg chg="add del mod">
           <ac:chgData name="Riccardo Berta" userId="c8694f89-bba4-4576-b0a8-456619ca5a8c" providerId="ADAL" clId="{FDDBFC5A-5EA9-5330-BEB8-433D7E3B4C4E}" dt="2025-09-04T06:08:51.182" v="2767" actId="478"/>
           <ac:picMkLst>
             <pc:docMk/>
             <pc:sldMk cId="3900298855" sldId="281"/>
             <ac:picMk id="4" creationId="{36A7088B-A474-C375-B814-78CDD03EE6EB}"/>
-          </ac:picMkLst>
-        </pc:picChg>
-        <pc:picChg chg="del mod">
-          <ac:chgData name="Riccardo Berta" userId="c8694f89-bba4-4576-b0a8-456619ca5a8c" providerId="ADAL" clId="{FDDBFC5A-5EA9-5330-BEB8-433D7E3B4C4E}" dt="2025-09-03T12:10:03.289" v="2602" actId="478"/>
-          <ac:picMkLst>
-            <pc:docMk/>
-            <pc:sldMk cId="3900298855" sldId="281"/>
-            <ac:picMk id="5" creationId="{457D846F-6D30-0542-F4C4-EAC656215B57}"/>
           </ac:picMkLst>
         </pc:picChg>
         <pc:picChg chg="add mod">
@@ -992,46 +905,6 @@
           <pc:docMk/>
           <pc:sldMk cId="323055796" sldId="282"/>
         </pc:sldMkLst>
-        <pc:spChg chg="mod">
-          <ac:chgData name="Riccardo Berta" userId="c8694f89-bba4-4576-b0a8-456619ca5a8c" providerId="ADAL" clId="{FDDBFC5A-5EA9-5330-BEB8-433D7E3B4C4E}" dt="2025-09-03T12:13:23.904" v="2668" actId="20577"/>
-          <ac:spMkLst>
-            <pc:docMk/>
-            <pc:sldMk cId="323055796" sldId="282"/>
-            <ac:spMk id="84" creationId="{00000000-0000-0000-0000-000000000000}"/>
-          </ac:spMkLst>
-        </pc:spChg>
-        <pc:picChg chg="del mod">
-          <ac:chgData name="Riccardo Berta" userId="c8694f89-bba4-4576-b0a8-456619ca5a8c" providerId="ADAL" clId="{FDDBFC5A-5EA9-5330-BEB8-433D7E3B4C4E}" dt="2025-09-03T12:13:25.850" v="2669" actId="478"/>
-          <ac:picMkLst>
-            <pc:docMk/>
-            <pc:sldMk cId="323055796" sldId="282"/>
-            <ac:picMk id="3" creationId="{E86135B7-72FB-F0C9-3532-22E86B629D14}"/>
-          </ac:picMkLst>
-        </pc:picChg>
-        <pc:picChg chg="del mod">
-          <ac:chgData name="Riccardo Berta" userId="c8694f89-bba4-4576-b0a8-456619ca5a8c" providerId="ADAL" clId="{FDDBFC5A-5EA9-5330-BEB8-433D7E3B4C4E}" dt="2025-09-03T11:22:21.412" v="2357" actId="478"/>
-          <ac:picMkLst>
-            <pc:docMk/>
-            <pc:sldMk cId="323055796" sldId="282"/>
-            <ac:picMk id="4" creationId="{AEFB4185-B5AC-F371-8AB3-954F228BC195}"/>
-          </ac:picMkLst>
-        </pc:picChg>
-        <pc:picChg chg="add mod">
-          <ac:chgData name="Riccardo Berta" userId="c8694f89-bba4-4576-b0a8-456619ca5a8c" providerId="ADAL" clId="{FDDBFC5A-5EA9-5330-BEB8-433D7E3B4C4E}" dt="2025-09-03T12:14:52.143" v="2670"/>
-          <ac:picMkLst>
-            <pc:docMk/>
-            <pc:sldMk cId="323055796" sldId="282"/>
-            <ac:picMk id="5" creationId="{266229AE-6090-3A74-76D4-98D2E201739D}"/>
-          </ac:picMkLst>
-        </pc:picChg>
-        <pc:picChg chg="del mod">
-          <ac:chgData name="Riccardo Berta" userId="c8694f89-bba4-4576-b0a8-456619ca5a8c" providerId="ADAL" clId="{FDDBFC5A-5EA9-5330-BEB8-433D7E3B4C4E}" dt="2025-09-03T12:14:54.023" v="2671" actId="478"/>
-          <ac:picMkLst>
-            <pc:docMk/>
-            <pc:sldMk cId="323055796" sldId="282"/>
-            <ac:picMk id="6" creationId="{3EEEC6EA-A965-8309-0772-E70593D11CD9}"/>
-          </ac:picMkLst>
-        </pc:picChg>
       </pc:sldChg>
       <pc:sldChg chg="addSp delSp modSp mod">
         <pc:chgData name="Riccardo Berta" userId="c8694f89-bba4-4576-b0a8-456619ca5a8c" providerId="ADAL" clId="{FDDBFC5A-5EA9-5330-BEB8-433D7E3B4C4E}" dt="2025-09-03T12:21:08.776" v="2716" actId="478"/>
@@ -1055,14 +928,6 @@
             <ac:spMk id="84" creationId="{00000000-0000-0000-0000-000000000000}"/>
           </ac:spMkLst>
         </pc:spChg>
-        <pc:picChg chg="del mod">
-          <ac:chgData name="Riccardo Berta" userId="c8694f89-bba4-4576-b0a8-456619ca5a8c" providerId="ADAL" clId="{FDDBFC5A-5EA9-5330-BEB8-433D7E3B4C4E}" dt="2025-09-03T12:21:08.776" v="2716" actId="478"/>
-          <ac:picMkLst>
-            <pc:docMk/>
-            <pc:sldMk cId="1326630385" sldId="283"/>
-            <ac:picMk id="3" creationId="{277FED06-6388-8A1F-D1F4-694DBE5255DF}"/>
-          </ac:picMkLst>
-        </pc:picChg>
         <pc:picChg chg="add mod">
           <ac:chgData name="Riccardo Berta" userId="c8694f89-bba4-4576-b0a8-456619ca5a8c" providerId="ADAL" clId="{FDDBFC5A-5EA9-5330-BEB8-433D7E3B4C4E}" dt="2025-09-03T12:20:57.324" v="2700" actId="1076"/>
           <ac:picMkLst>
@@ -1094,14 +959,6 @@
             <ac:picMk id="2" creationId="{BA34A385-508D-AB2C-CCFB-9CD601B0393F}"/>
           </ac:picMkLst>
         </pc:picChg>
-        <pc:picChg chg="del">
-          <ac:chgData name="Riccardo Berta" userId="c8694f89-bba4-4576-b0a8-456619ca5a8c" providerId="ADAL" clId="{FDDBFC5A-5EA9-5330-BEB8-433D7E3B4C4E}" dt="2025-09-03T10:51:35.449" v="2183" actId="478"/>
-          <ac:picMkLst>
-            <pc:docMk/>
-            <pc:sldMk cId="265439497" sldId="285"/>
-            <ac:picMk id="3" creationId="{2C7437BC-50BC-85B1-2FB0-B6D1E9EAE752}"/>
-          </ac:picMkLst>
-        </pc:picChg>
       </pc:sldChg>
       <pc:sldChg chg="addSp delSp modSp add mod">
         <pc:chgData name="Riccardo Berta" userId="c8694f89-bba4-4576-b0a8-456619ca5a8c" providerId="ADAL" clId="{FDDBFC5A-5EA9-5330-BEB8-433D7E3B4C4E}" dt="2025-09-02T11:38:32.714" v="188" actId="1076"/>
@@ -1126,6 +983,29 @@
           </ac:picMkLst>
         </pc:picChg>
       </pc:sldChg>
+      <pc:sldChg chg="addSp delSp modSp new mod">
+        <pc:chgData name="Riccardo Berta" userId="c8694f89-bba4-4576-b0a8-456619ca5a8c" providerId="ADAL" clId="{FDDBFC5A-5EA9-5330-BEB8-433D7E3B4C4E}" dt="2025-09-05T15:08:44.065" v="2777" actId="122"/>
+        <pc:sldMkLst>
+          <pc:docMk/>
+          <pc:sldMk cId="1916596512" sldId="287"/>
+        </pc:sldMkLst>
+        <pc:spChg chg="del">
+          <ac:chgData name="Riccardo Berta" userId="c8694f89-bba4-4576-b0a8-456619ca5a8c" providerId="ADAL" clId="{FDDBFC5A-5EA9-5330-BEB8-433D7E3B4C4E}" dt="2025-09-05T15:08:31.905" v="2774" actId="478"/>
+          <ac:spMkLst>
+            <pc:docMk/>
+            <pc:sldMk cId="1916596512" sldId="287"/>
+            <ac:spMk id="2" creationId="{2FBE6ED0-96CF-8513-FB47-1884E510C135}"/>
+          </ac:spMkLst>
+        </pc:spChg>
+        <pc:spChg chg="add mod">
+          <ac:chgData name="Riccardo Berta" userId="c8694f89-bba4-4576-b0a8-456619ca5a8c" providerId="ADAL" clId="{FDDBFC5A-5EA9-5330-BEB8-433D7E3B4C4E}" dt="2025-09-05T15:08:44.065" v="2777" actId="122"/>
+          <ac:spMkLst>
+            <pc:docMk/>
+            <pc:sldMk cId="1916596512" sldId="287"/>
+            <ac:spMk id="3" creationId="{4474B5C4-D64A-3E47-0D38-BCC373BDE890}"/>
+          </ac:spMkLst>
+        </pc:spChg>
+      </pc:sldChg>
       <pc:sldChg chg="new del">
         <pc:chgData name="Riccardo Berta" userId="c8694f89-bba4-4576-b0a8-456619ca5a8c" providerId="ADAL" clId="{FDDBFC5A-5EA9-5330-BEB8-433D7E3B4C4E}" dt="2025-09-03T06:32:19.873" v="1414" actId="2696"/>
         <pc:sldMkLst>
@@ -1139,14 +1019,6 @@
           <pc:docMk/>
           <pc:sldMk cId="2720781894" sldId="287"/>
         </pc:sldMkLst>
-        <pc:spChg chg="mod">
-          <ac:chgData name="Riccardo Berta" userId="c8694f89-bba4-4576-b0a8-456619ca5a8c" providerId="ADAL" clId="{FDDBFC5A-5EA9-5330-BEB8-433D7E3B4C4E}" dt="2025-09-03T06:32:08.423" v="1411" actId="15"/>
-          <ac:spMkLst>
-            <pc:docMk/>
-            <pc:sldMk cId="2720781894" sldId="287"/>
-            <ac:spMk id="2" creationId="{CBD87483-CF48-B58E-07FF-C62938F1197D}"/>
-          </ac:spMkLst>
-        </pc:spChg>
       </pc:sldChg>
       <pc:sldMasterChg chg="modSp mod modSldLayout">
         <pc:chgData name="Riccardo Berta" userId="c8694f89-bba4-4576-b0a8-456619ca5a8c" providerId="ADAL" clId="{FDDBFC5A-5EA9-5330-BEB8-433D7E3B4C4E}" dt="2025-09-03T06:31:35.367" v="1399" actId="948"/>
@@ -13268,6 +13140,109 @@
 </p:sld>
 </file>
 
+<file path=ppt/slides/slide22.xml><?xml version="1.0" encoding="utf-8"?>
+<p:sld xmlns:a="http://schemas.openxmlformats.org/drawingml/2006/main" xmlns:r="http://schemas.openxmlformats.org/officeDocument/2006/relationships" xmlns:p="http://schemas.openxmlformats.org/presentationml/2006/main">
+  <p:cSld>
+    <p:spTree>
+      <p:nvGrpSpPr>
+        <p:cNvPr id="1" name=""/>
+        <p:cNvGrpSpPr/>
+        <p:nvPr/>
+      </p:nvGrpSpPr>
+      <p:grpSpPr>
+        <a:xfrm>
+          <a:off x="0" y="0"/>
+          <a:ext cx="0" cy="0"/>
+          <a:chOff x="0" y="0"/>
+          <a:chExt cx="0" cy="0"/>
+        </a:xfrm>
+      </p:grpSpPr>
+      <p:sp>
+        <p:nvSpPr>
+          <p:cNvPr id="3" name="CasellaDiTesto 2">
+            <a:extLst>
+              <a:ext uri="{FF2B5EF4-FFF2-40B4-BE49-F238E27FC236}">
+                <a16:creationId xmlns:a16="http://schemas.microsoft.com/office/drawing/2014/main" id="{4474B5C4-D64A-3E47-0D38-BCC373BDE890}"/>
+              </a:ext>
+            </a:extLst>
+          </p:cNvPr>
+          <p:cNvSpPr txBox="1"/>
+          <p:nvPr/>
+        </p:nvSpPr>
+        <p:spPr>
+          <a:xfrm>
+            <a:off x="956023" y="2844224"/>
+            <a:ext cx="7596951" cy="1169551"/>
+          </a:xfrm>
+          <a:prstGeom prst="rect">
+            <a:avLst/>
+          </a:prstGeom>
+          <a:noFill/>
+        </p:spPr>
+        <p:txBody>
+          <a:bodyPr wrap="none" rtlCol="0">
+            <a:spAutoFit/>
+          </a:bodyPr>
+          <a:lstStyle/>
+          <a:p>
+            <a:pPr algn="ctr"/>
+            <a:r>
+              <a:rPr lang="en-GB" sz="2800" i="1" dirty="0">
+                <a:effectLst/>
+                <a:latin typeface="Times"/>
+              </a:rPr>
+              <a:t>There are 10 kinds of people in this world: </a:t>
+            </a:r>
+            <a:br>
+              <a:rPr lang="en-GB" sz="2800" i="1" dirty="0">
+                <a:effectLst/>
+                <a:latin typeface="Times"/>
+              </a:rPr>
+            </a:br>
+            <a:r>
+              <a:rPr lang="en-GB" sz="2800" i="1" dirty="0">
+                <a:effectLst/>
+                <a:latin typeface="Times"/>
+              </a:rPr>
+              <a:t>those who can count in</a:t>
+            </a:r>
+            <a:r>
+              <a:rPr lang="en-GB" sz="2800" dirty="0">
+                <a:latin typeface="Times"/>
+              </a:rPr>
+              <a:t> </a:t>
+            </a:r>
+            <a:r>
+              <a:rPr lang="en-GB" sz="2800" i="1" dirty="0">
+                <a:effectLst/>
+                <a:latin typeface="Times"/>
+              </a:rPr>
+              <a:t>binary and those who can’t</a:t>
+            </a:r>
+            <a:endParaRPr lang="en-GB" sz="2800" dirty="0">
+              <a:effectLst/>
+              <a:latin typeface="Times"/>
+            </a:endParaRPr>
+          </a:p>
+          <a:p>
+            <a:pPr algn="ctr"/>
+            <a:endParaRPr lang="en-GB" dirty="0"/>
+          </a:p>
+        </p:txBody>
+      </p:sp>
+    </p:spTree>
+    <p:extLst>
+      <p:ext uri="{BB962C8B-B14F-4D97-AF65-F5344CB8AC3E}">
+        <p14:creationId xmlns:p14="http://schemas.microsoft.com/office/powerpoint/2010/main" val="1916596512"/>
+      </p:ext>
+    </p:extLst>
+  </p:cSld>
+  <p:clrMapOvr>
+    <a:masterClrMapping/>
+  </p:clrMapOvr>
+</p:sld>
+</file>
+
 <file path=ppt/slides/slide3.xml><?xml version="1.0" encoding="utf-8"?>
 <p:sld xmlns:a="http://schemas.openxmlformats.org/drawingml/2006/main" xmlns:r="http://schemas.openxmlformats.org/officeDocument/2006/relationships" xmlns:p="http://schemas.openxmlformats.org/presentationml/2006/main">
   <p:cSld>
@@ -15646,17 +15621,6 @@
 </file>
 
 <file path=customXml/item1.xml><?xml version="1.0" encoding="utf-8"?>
-<p:properties xmlns:p="http://schemas.microsoft.com/office/2006/metadata/properties" xmlns:xsi="http://www.w3.org/2001/XMLSchema-instance" xmlns:pc="http://schemas.microsoft.com/office/infopath/2007/PartnerControls">
-  <documentManagement>
-    <TaxCatchAll xmlns="e9b5433c-2372-4cb7-8bab-09518096b29b" xsi:nil="true"/>
-    <lcf76f155ced4ddcb4097134ff3c332f xmlns="3bd0d43f-5e5b-43cd-b6fc-691bd77672c6">
-      <Terms xmlns="http://schemas.microsoft.com/office/infopath/2007/PartnerControls"/>
-    </lcf76f155ced4ddcb4097134ff3c332f>
-  </documentManagement>
-</p:properties>
-</file>
-
-<file path=customXml/item2.xml><?xml version="1.0" encoding="utf-8"?>
 <ct:contentTypeSchema xmlns:ct="http://schemas.microsoft.com/office/2006/metadata/contentType" xmlns:ma="http://schemas.microsoft.com/office/2006/metadata/properties/metaAttributes" ct:_="" ma:_="" ma:contentTypeName="Documento" ma:contentTypeID="0x010100B8FA822B18A0634FB7342CF29752587A" ma:contentTypeVersion="12" ma:contentTypeDescription="Creare un nuovo documento." ma:contentTypeScope="" ma:versionID="4c8b1e8002f5a6c880c83187af115cef">
   <xsd:schema xmlns:xsd="http://www.w3.org/2001/XMLSchema" xmlns:xs="http://www.w3.org/2001/XMLSchema" xmlns:p="http://schemas.microsoft.com/office/2006/metadata/properties" xmlns:ns2="3bd0d43f-5e5b-43cd-b6fc-691bd77672c6" xmlns:ns3="e9b5433c-2372-4cb7-8bab-09518096b29b" targetNamespace="http://schemas.microsoft.com/office/2006/metadata/properties" ma:root="true" ma:fieldsID="618b708abf3b656f834d84e193700042" ns2:_="" ns3:_="">
     <xsd:import namespace="3bd0d43f-5e5b-43cd-b6fc-691bd77672c6"/>
@@ -15857,6 +15821,17 @@
 </ct:contentTypeSchema>
 </file>
 
+<file path=customXml/item2.xml><?xml version="1.0" encoding="utf-8"?>
+<p:properties xmlns:p="http://schemas.microsoft.com/office/2006/metadata/properties" xmlns:xsi="http://www.w3.org/2001/XMLSchema-instance" xmlns:pc="http://schemas.microsoft.com/office/infopath/2007/PartnerControls">
+  <documentManagement>
+    <TaxCatchAll xmlns="e9b5433c-2372-4cb7-8bab-09518096b29b" xsi:nil="true"/>
+    <lcf76f155ced4ddcb4097134ff3c332f xmlns="3bd0d43f-5e5b-43cd-b6fc-691bd77672c6">
+      <Terms xmlns="http://schemas.microsoft.com/office/infopath/2007/PartnerControls"/>
+    </lcf76f155ced4ddcb4097134ff3c332f>
+  </documentManagement>
+</p:properties>
+</file>
+
 <file path=customXml/item3.xml><?xml version="1.0" encoding="utf-8"?>
 <?mso-contentType ?>
 <FormTemplates xmlns="http://schemas.microsoft.com/sharepoint/v3/contenttype/forms">
@@ -15867,23 +15842,6 @@
 </file>
 
 <file path=customXml/itemProps1.xml><?xml version="1.0" encoding="utf-8"?>
-<ds:datastoreItem xmlns:ds="http://schemas.openxmlformats.org/officeDocument/2006/customXml" ds:itemID="{F6C3D220-DD37-4202-B620-769B4D200BE0}">
-  <ds:schemaRefs>
-    <ds:schemaRef ds:uri="http://schemas.microsoft.com/office/2006/documentManagement/types"/>
-    <ds:schemaRef ds:uri="http://purl.org/dc/elements/1.1/"/>
-    <ds:schemaRef ds:uri="http://purl.org/dc/dcmitype/"/>
-    <ds:schemaRef ds:uri="http://www.w3.org/XML/1998/namespace"/>
-    <ds:schemaRef ds:uri="http://purl.org/dc/terms/"/>
-    <ds:schemaRef ds:uri="e9b5433c-2372-4cb7-8bab-09518096b29b"/>
-    <ds:schemaRef ds:uri="http://schemas.microsoft.com/office/infopath/2007/PartnerControls"/>
-    <ds:schemaRef ds:uri="http://schemas.openxmlformats.org/package/2006/metadata/core-properties"/>
-    <ds:schemaRef ds:uri="3bd0d43f-5e5b-43cd-b6fc-691bd77672c6"/>
-    <ds:schemaRef ds:uri="http://schemas.microsoft.com/office/2006/metadata/properties"/>
-  </ds:schemaRefs>
-</ds:datastoreItem>
-</file>
-
-<file path=customXml/itemProps2.xml><?xml version="1.0" encoding="utf-8"?>
 <ds:datastoreItem xmlns:ds="http://schemas.openxmlformats.org/officeDocument/2006/customXml" ds:itemID="{46BF699B-8A31-4CA3-87CE-C50FF3102B98}">
   <ds:schemaRefs>
     <ds:schemaRef ds:uri="http://schemas.microsoft.com/office/2006/metadata/contentType"/>
@@ -15902,6 +15860,23 @@
 </ds:datastoreItem>
 </file>
 
+<file path=customXml/itemProps2.xml><?xml version="1.0" encoding="utf-8"?>
+<ds:datastoreItem xmlns:ds="http://schemas.openxmlformats.org/officeDocument/2006/customXml" ds:itemID="{F6C3D220-DD37-4202-B620-769B4D200BE0}">
+  <ds:schemaRefs>
+    <ds:schemaRef ds:uri="http://purl.org/dc/terms/"/>
+    <ds:schemaRef ds:uri="http://schemas.microsoft.com/office/2006/documentManagement/types"/>
+    <ds:schemaRef ds:uri="http://schemas.microsoft.com/office/2006/metadata/properties"/>
+    <ds:schemaRef ds:uri="e9b5433c-2372-4cb7-8bab-09518096b29b"/>
+    <ds:schemaRef ds:uri="3bd0d43f-5e5b-43cd-b6fc-691bd77672c6"/>
+    <ds:schemaRef ds:uri="http://purl.org/dc/dcmitype/"/>
+    <ds:schemaRef ds:uri="http://purl.org/dc/elements/1.1/"/>
+    <ds:schemaRef ds:uri="http://schemas.microsoft.com/office/infopath/2007/PartnerControls"/>
+    <ds:schemaRef ds:uri="http://schemas.openxmlformats.org/package/2006/metadata/core-properties"/>
+    <ds:schemaRef ds:uri="http://www.w3.org/XML/1998/namespace"/>
+  </ds:schemaRefs>
+</ds:datastoreItem>
+</file>
+
 <file path=customXml/itemProps3.xml><?xml version="1.0" encoding="utf-8"?>
 <ds:datastoreItem xmlns:ds="http://schemas.openxmlformats.org/officeDocument/2006/customXml" ds:itemID="{A3339F5B-E2B7-465F-9C51-9972825DF05E}">
   <ds:schemaRefs>

</xml_diff>

<commit_message>
Fix on boolean algebra exercises
</commit_message>
<xml_diff>
--- a/02 - Data Representation/slides.pptx
+++ b/02 - Data Representation/slides.pptx
@@ -5,7 +5,7 @@
     <p:sldMasterId id="2147483659" r:id="rId4"/>
   </p:sldMasterIdLst>
   <p:notesMasterIdLst>
-    <p:notesMasterId r:id="rId27"/>
+    <p:notesMasterId r:id="rId28"/>
   </p:notesMasterIdLst>
   <p:sldIdLst>
     <p:sldId id="256" r:id="rId5"/>
@@ -27,26 +27,27 @@
     <p:sldId id="285" r:id="rId21"/>
     <p:sldId id="278" r:id="rId22"/>
     <p:sldId id="279" r:id="rId23"/>
-    <p:sldId id="281" r:id="rId24"/>
-    <p:sldId id="283" r:id="rId25"/>
-    <p:sldId id="287" r:id="rId26"/>
+    <p:sldId id="288" r:id="rId24"/>
+    <p:sldId id="281" r:id="rId25"/>
+    <p:sldId id="283" r:id="rId26"/>
+    <p:sldId id="287" r:id="rId27"/>
   </p:sldIdLst>
   <p:sldSz cx="9144000" cy="6858000" type="screen4x3"/>
   <p:notesSz cx="6858000" cy="9144000"/>
   <p:embeddedFontLst>
     <p:embeddedFont>
       <p:font typeface="Economica" panose="02000506040000020004" pitchFamily="2" charset="77"/>
-      <p:regular r:id="rId28"/>
-      <p:bold r:id="rId29"/>
-      <p:italic r:id="rId30"/>
-      <p:boldItalic r:id="rId31"/>
+      <p:regular r:id="rId29"/>
+      <p:bold r:id="rId30"/>
+      <p:italic r:id="rId31"/>
+      <p:boldItalic r:id="rId32"/>
     </p:embeddedFont>
     <p:embeddedFont>
       <p:font typeface="Open Sans" panose="020B0606030504020204" pitchFamily="34" charset="0"/>
-      <p:regular r:id="rId32"/>
-      <p:bold r:id="rId33"/>
-      <p:italic r:id="rId34"/>
-      <p:boldItalic r:id="rId35"/>
+      <p:regular r:id="rId33"/>
+      <p:bold r:id="rId34"/>
+      <p:italic r:id="rId35"/>
+      <p:boldItalic r:id="rId36"/>
     </p:embeddedFont>
   </p:embeddedFontLst>
   <p:defaultTextStyle>
@@ -292,7 +293,7 @@
 <file path=ppt/revisionInfo.xml><?xml version="1.0" encoding="utf-8"?>
 <p1510:revInfo xmlns:a="http://schemas.openxmlformats.org/drawingml/2006/main" xmlns:r="http://schemas.openxmlformats.org/officeDocument/2006/relationships" xmlns:p1510="http://schemas.microsoft.com/office/powerpoint/2015/10/main">
   <p1510:revLst>
-    <p1510:client id="{1653CC8A-6601-4148-97E4-ACD0271BFCFF}" v="1" dt="2025-10-03T05:37:54.382"/>
+    <p1510:client id="{1653CC8A-6601-4148-97E4-ACD0271BFCFF}" v="2" dt="2025-10-08T09:49:13.410"/>
   </p1510:revLst>
 </p1510:revInfo>
 </file>
@@ -302,7 +303,7 @@
   <pc:docChgLst>
     <pc:chgData name="Riccardo Berta" userId="c8694f89-bba4-4576-b0a8-456619ca5a8c" providerId="ADAL" clId="{FDDBFC5A-5EA9-5330-BEB8-433D7E3B4C4E}"/>
     <pc:docChg chg="undo redo custSel addSld delSld modSld sldOrd modMainMaster">
-      <pc:chgData name="Riccardo Berta" userId="c8694f89-bba4-4576-b0a8-456619ca5a8c" providerId="ADAL" clId="{FDDBFC5A-5EA9-5330-BEB8-433D7E3B4C4E}" dt="2025-10-03T05:37:59.376" v="2781" actId="1076"/>
+      <pc:chgData name="Riccardo Berta" userId="c8694f89-bba4-4576-b0a8-456619ca5a8c" providerId="ADAL" clId="{FDDBFC5A-5EA9-5330-BEB8-433D7E3B4C4E}" dt="2025-10-08T09:51:44.189" v="2923" actId="20577"/>
       <pc:docMkLst>
         <pc:docMk/>
       </pc:docMkLst>
@@ -319,22 +320,6 @@
           <pc:docMk/>
           <pc:sldMk cId="0" sldId="257"/>
         </pc:sldMkLst>
-        <pc:spChg chg="mod">
-          <ac:chgData name="Riccardo Berta" userId="c8694f89-bba4-4576-b0a8-456619ca5a8c" providerId="ADAL" clId="{FDDBFC5A-5EA9-5330-BEB8-433D7E3B4C4E}" dt="2025-09-03T06:32:54.251" v="1419" actId="20577"/>
-          <ac:spMkLst>
-            <pc:docMk/>
-            <pc:sldMk cId="0" sldId="257"/>
-            <ac:spMk id="84" creationId="{00000000-0000-0000-0000-000000000000}"/>
-          </ac:spMkLst>
-        </pc:spChg>
-        <pc:picChg chg="add mod">
-          <ac:chgData name="Riccardo Berta" userId="c8694f89-bba4-4576-b0a8-456619ca5a8c" providerId="ADAL" clId="{FDDBFC5A-5EA9-5330-BEB8-433D7E3B4C4E}" dt="2025-09-03T06:32:59.521" v="1420" actId="14100"/>
-          <ac:picMkLst>
-            <pc:docMk/>
-            <pc:sldMk cId="0" sldId="257"/>
-            <ac:picMk id="2" creationId="{2A2797AE-222D-581B-6BB9-DBA4EC029B67}"/>
-          </ac:picMkLst>
-        </pc:picChg>
       </pc:sldChg>
       <pc:sldChg chg="modSp mod">
         <pc:chgData name="Riccardo Berta" userId="c8694f89-bba4-4576-b0a8-456619ca5a8c" providerId="ADAL" clId="{FDDBFC5A-5EA9-5330-BEB8-433D7E3B4C4E}" dt="2025-09-03T10:43:30.291" v="2182" actId="14100"/>
@@ -342,14 +327,6 @@
           <pc:docMk/>
           <pc:sldMk cId="3018556184" sldId="259"/>
         </pc:sldMkLst>
-        <pc:spChg chg="mod">
-          <ac:chgData name="Riccardo Berta" userId="c8694f89-bba4-4576-b0a8-456619ca5a8c" providerId="ADAL" clId="{FDDBFC5A-5EA9-5330-BEB8-433D7E3B4C4E}" dt="2025-09-03T10:43:30.291" v="2182" actId="14100"/>
-          <ac:spMkLst>
-            <pc:docMk/>
-            <pc:sldMk cId="3018556184" sldId="259"/>
-            <ac:spMk id="3" creationId="{38BFAA1C-1163-169B-2D77-6FEF73CC8512}"/>
-          </ac:spMkLst>
-        </pc:spChg>
       </pc:sldChg>
       <pc:sldChg chg="addSp delSp modSp mod">
         <pc:chgData name="Riccardo Berta" userId="c8694f89-bba4-4576-b0a8-456619ca5a8c" providerId="ADAL" clId="{FDDBFC5A-5EA9-5330-BEB8-433D7E3B4C4E}" dt="2025-09-03T06:33:28.787" v="1427" actId="1076"/>
@@ -357,30 +334,6 @@
           <pc:docMk/>
           <pc:sldMk cId="2119751735" sldId="260"/>
         </pc:sldMkLst>
-        <pc:spChg chg="mod">
-          <ac:chgData name="Riccardo Berta" userId="c8694f89-bba4-4576-b0a8-456619ca5a8c" providerId="ADAL" clId="{FDDBFC5A-5EA9-5330-BEB8-433D7E3B4C4E}" dt="2025-09-03T06:33:22.461" v="1425" actId="20577"/>
-          <ac:spMkLst>
-            <pc:docMk/>
-            <pc:sldMk cId="2119751735" sldId="260"/>
-            <ac:spMk id="84" creationId="{00000000-0000-0000-0000-000000000000}"/>
-          </ac:spMkLst>
-        </pc:spChg>
-        <pc:picChg chg="add mod">
-          <ac:chgData name="Riccardo Berta" userId="c8694f89-bba4-4576-b0a8-456619ca5a8c" providerId="ADAL" clId="{FDDBFC5A-5EA9-5330-BEB8-433D7E3B4C4E}" dt="2025-09-03T06:33:28.787" v="1427" actId="1076"/>
-          <ac:picMkLst>
-            <pc:docMk/>
-            <pc:sldMk cId="2119751735" sldId="260"/>
-            <ac:picMk id="5" creationId="{80A9195B-913D-EF49-3DD3-3B72CC33F0AD}"/>
-          </ac:picMkLst>
-        </pc:picChg>
-        <pc:picChg chg="add mod">
-          <ac:chgData name="Riccardo Berta" userId="c8694f89-bba4-4576-b0a8-456619ca5a8c" providerId="ADAL" clId="{FDDBFC5A-5EA9-5330-BEB8-433D7E3B4C4E}" dt="2025-09-03T06:33:20.457" v="1424" actId="1076"/>
-          <ac:picMkLst>
-            <pc:docMk/>
-            <pc:sldMk cId="2119751735" sldId="260"/>
-            <ac:picMk id="10" creationId="{39247DD4-4A21-71ED-0E52-F3817EB097B2}"/>
-          </ac:picMkLst>
-        </pc:picChg>
       </pc:sldChg>
       <pc:sldChg chg="addSp delSp modSp mod">
         <pc:chgData name="Riccardo Berta" userId="c8694f89-bba4-4576-b0a8-456619ca5a8c" providerId="ADAL" clId="{FDDBFC5A-5EA9-5330-BEB8-433D7E3B4C4E}" dt="2025-09-02T11:26:42.092" v="180" actId="1076"/>
@@ -395,38 +348,6 @@
           <pc:docMk/>
           <pc:sldMk cId="1270389364" sldId="262"/>
         </pc:sldMkLst>
-        <pc:spChg chg="mod">
-          <ac:chgData name="Riccardo Berta" userId="c8694f89-bba4-4576-b0a8-456619ca5a8c" providerId="ADAL" clId="{FDDBFC5A-5EA9-5330-BEB8-433D7E3B4C4E}" dt="2025-09-03T06:26:23.414" v="1373" actId="20577"/>
-          <ac:spMkLst>
-            <pc:docMk/>
-            <pc:sldMk cId="1270389364" sldId="262"/>
-            <ac:spMk id="84" creationId="{00000000-0000-0000-0000-000000000000}"/>
-          </ac:spMkLst>
-        </pc:spChg>
-        <pc:picChg chg="add mod">
-          <ac:chgData name="Riccardo Berta" userId="c8694f89-bba4-4576-b0a8-456619ca5a8c" providerId="ADAL" clId="{FDDBFC5A-5EA9-5330-BEB8-433D7E3B4C4E}" dt="2025-09-03T06:27:24.876" v="1389" actId="1076"/>
-          <ac:picMkLst>
-            <pc:docMk/>
-            <pc:sldMk cId="1270389364" sldId="262"/>
-            <ac:picMk id="3" creationId="{6DD67C5A-882F-7DE1-0164-CC759465A65C}"/>
-          </ac:picMkLst>
-        </pc:picChg>
-        <pc:picChg chg="add mod">
-          <ac:chgData name="Riccardo Berta" userId="c8694f89-bba4-4576-b0a8-456619ca5a8c" providerId="ADAL" clId="{FDDBFC5A-5EA9-5330-BEB8-433D7E3B4C4E}" dt="2025-09-03T06:27:21.534" v="1388" actId="1076"/>
-          <ac:picMkLst>
-            <pc:docMk/>
-            <pc:sldMk cId="1270389364" sldId="262"/>
-            <ac:picMk id="5" creationId="{C1F1BFCC-6556-D288-4216-7F9B327C5A2A}"/>
-          </ac:picMkLst>
-        </pc:picChg>
-        <pc:picChg chg="add mod">
-          <ac:chgData name="Riccardo Berta" userId="c8694f89-bba4-4576-b0a8-456619ca5a8c" providerId="ADAL" clId="{FDDBFC5A-5EA9-5330-BEB8-433D7E3B4C4E}" dt="2025-09-03T06:27:20.380" v="1387" actId="1076"/>
-          <ac:picMkLst>
-            <pc:docMk/>
-            <pc:sldMk cId="1270389364" sldId="262"/>
-            <ac:picMk id="6" creationId="{938BF62C-393B-DDF9-7EF9-6DEE02EF250C}"/>
-          </ac:picMkLst>
-        </pc:picChg>
       </pc:sldChg>
       <pc:sldChg chg="addSp delSp modSp mod">
         <pc:chgData name="Riccardo Berta" userId="c8694f89-bba4-4576-b0a8-456619ca5a8c" providerId="ADAL" clId="{FDDBFC5A-5EA9-5330-BEB8-433D7E3B4C4E}" dt="2025-09-03T07:28:09.468" v="1491" actId="1076"/>
@@ -434,30 +355,6 @@
           <pc:docMk/>
           <pc:sldMk cId="2644872656" sldId="263"/>
         </pc:sldMkLst>
-        <pc:spChg chg="mod">
-          <ac:chgData name="Riccardo Berta" userId="c8694f89-bba4-4576-b0a8-456619ca5a8c" providerId="ADAL" clId="{FDDBFC5A-5EA9-5330-BEB8-433D7E3B4C4E}" dt="2025-09-03T07:22:07.366" v="1479" actId="948"/>
-          <ac:spMkLst>
-            <pc:docMk/>
-            <pc:sldMk cId="2644872656" sldId="263"/>
-            <ac:spMk id="84" creationId="{00000000-0000-0000-0000-000000000000}"/>
-          </ac:spMkLst>
-        </pc:spChg>
-        <pc:picChg chg="add mod">
-          <ac:chgData name="Riccardo Berta" userId="c8694f89-bba4-4576-b0a8-456619ca5a8c" providerId="ADAL" clId="{FDDBFC5A-5EA9-5330-BEB8-433D7E3B4C4E}" dt="2025-09-03T07:25:24.747" v="1483" actId="1076"/>
-          <ac:picMkLst>
-            <pc:docMk/>
-            <pc:sldMk cId="2644872656" sldId="263"/>
-            <ac:picMk id="2" creationId="{AA04E2F9-A4B5-7E2E-0425-8863373570B1}"/>
-          </ac:picMkLst>
-        </pc:picChg>
-        <pc:picChg chg="add mod">
-          <ac:chgData name="Riccardo Berta" userId="c8694f89-bba4-4576-b0a8-456619ca5a8c" providerId="ADAL" clId="{FDDBFC5A-5EA9-5330-BEB8-433D7E3B4C4E}" dt="2025-09-03T07:28:09.468" v="1491" actId="1076"/>
-          <ac:picMkLst>
-            <pc:docMk/>
-            <pc:sldMk cId="2644872656" sldId="263"/>
-            <ac:picMk id="4" creationId="{2359E7C1-487D-EFB4-54D5-5958593CDB19}"/>
-          </ac:picMkLst>
-        </pc:picChg>
       </pc:sldChg>
       <pc:sldChg chg="addSp modSp mod">
         <pc:chgData name="Riccardo Berta" userId="c8694f89-bba4-4576-b0a8-456619ca5a8c" providerId="ADAL" clId="{FDDBFC5A-5EA9-5330-BEB8-433D7E3B4C4E}" dt="2025-09-03T07:36:52.255" v="1547" actId="14100"/>
@@ -465,22 +362,6 @@
           <pc:docMk/>
           <pc:sldMk cId="1681389695" sldId="264"/>
         </pc:sldMkLst>
-        <pc:spChg chg="mod">
-          <ac:chgData name="Riccardo Berta" userId="c8694f89-bba4-4576-b0a8-456619ca5a8c" providerId="ADAL" clId="{FDDBFC5A-5EA9-5330-BEB8-433D7E3B4C4E}" dt="2025-09-03T07:36:34.148" v="1542" actId="20577"/>
-          <ac:spMkLst>
-            <pc:docMk/>
-            <pc:sldMk cId="1681389695" sldId="264"/>
-            <ac:spMk id="84" creationId="{00000000-0000-0000-0000-000000000000}"/>
-          </ac:spMkLst>
-        </pc:spChg>
-        <pc:picChg chg="add mod">
-          <ac:chgData name="Riccardo Berta" userId="c8694f89-bba4-4576-b0a8-456619ca5a8c" providerId="ADAL" clId="{FDDBFC5A-5EA9-5330-BEB8-433D7E3B4C4E}" dt="2025-09-03T07:36:52.255" v="1547" actId="14100"/>
-          <ac:picMkLst>
-            <pc:docMk/>
-            <pc:sldMk cId="1681389695" sldId="264"/>
-            <ac:picMk id="2" creationId="{02774158-0805-DDE5-602E-04DE880A9E82}"/>
-          </ac:picMkLst>
-        </pc:picChg>
       </pc:sldChg>
       <pc:sldChg chg="addSp delSp modSp mod">
         <pc:chgData name="Riccardo Berta" userId="c8694f89-bba4-4576-b0a8-456619ca5a8c" providerId="ADAL" clId="{FDDBFC5A-5EA9-5330-BEB8-433D7E3B4C4E}" dt="2025-09-03T07:41:21.740" v="1626" actId="1076"/>
@@ -488,30 +369,6 @@
           <pc:docMk/>
           <pc:sldMk cId="2862573505" sldId="265"/>
         </pc:sldMkLst>
-        <pc:spChg chg="mod">
-          <ac:chgData name="Riccardo Berta" userId="c8694f89-bba4-4576-b0a8-456619ca5a8c" providerId="ADAL" clId="{FDDBFC5A-5EA9-5330-BEB8-433D7E3B4C4E}" dt="2025-09-03T07:41:17.109" v="1625" actId="20577"/>
-          <ac:spMkLst>
-            <pc:docMk/>
-            <pc:sldMk cId="2862573505" sldId="265"/>
-            <ac:spMk id="84" creationId="{00000000-0000-0000-0000-000000000000}"/>
-          </ac:spMkLst>
-        </pc:spChg>
-        <pc:picChg chg="add mod">
-          <ac:chgData name="Riccardo Berta" userId="c8694f89-bba4-4576-b0a8-456619ca5a8c" providerId="ADAL" clId="{FDDBFC5A-5EA9-5330-BEB8-433D7E3B4C4E}" dt="2025-09-03T07:41:21.740" v="1626" actId="1076"/>
-          <ac:picMkLst>
-            <pc:docMk/>
-            <pc:sldMk cId="2862573505" sldId="265"/>
-            <ac:picMk id="2" creationId="{F9E65655-9339-E514-30F3-C40A6F4E0C30}"/>
-          </ac:picMkLst>
-        </pc:picChg>
-        <pc:picChg chg="add mod">
-          <ac:chgData name="Riccardo Berta" userId="c8694f89-bba4-4576-b0a8-456619ca5a8c" providerId="ADAL" clId="{FDDBFC5A-5EA9-5330-BEB8-433D7E3B4C4E}" dt="2025-09-03T07:40:58.621" v="1617" actId="1076"/>
-          <ac:picMkLst>
-            <pc:docMk/>
-            <pc:sldMk cId="2862573505" sldId="265"/>
-            <ac:picMk id="4" creationId="{DA7A49FB-01F0-0611-F6E4-0F40B6AA0F20}"/>
-          </ac:picMkLst>
-        </pc:picChg>
       </pc:sldChg>
       <pc:sldChg chg="addSp delSp modSp mod">
         <pc:chgData name="Riccardo Berta" userId="c8694f89-bba4-4576-b0a8-456619ca5a8c" providerId="ADAL" clId="{FDDBFC5A-5EA9-5330-BEB8-433D7E3B4C4E}" dt="2025-09-03T08:37:22.782" v="1935" actId="20577"/>
@@ -519,38 +376,6 @@
           <pc:docMk/>
           <pc:sldMk cId="4181844165" sldId="266"/>
         </pc:sldMkLst>
-        <pc:spChg chg="mod">
-          <ac:chgData name="Riccardo Berta" userId="c8694f89-bba4-4576-b0a8-456619ca5a8c" providerId="ADAL" clId="{FDDBFC5A-5EA9-5330-BEB8-433D7E3B4C4E}" dt="2025-09-03T08:37:22.782" v="1935" actId="20577"/>
-          <ac:spMkLst>
-            <pc:docMk/>
-            <pc:sldMk cId="4181844165" sldId="266"/>
-            <ac:spMk id="83" creationId="{00000000-0000-0000-0000-000000000000}"/>
-          </ac:spMkLst>
-        </pc:spChg>
-        <pc:spChg chg="mod">
-          <ac:chgData name="Riccardo Berta" userId="c8694f89-bba4-4576-b0a8-456619ca5a8c" providerId="ADAL" clId="{FDDBFC5A-5EA9-5330-BEB8-433D7E3B4C4E}" dt="2025-09-03T07:48:38.718" v="1689" actId="20577"/>
-          <ac:spMkLst>
-            <pc:docMk/>
-            <pc:sldMk cId="4181844165" sldId="266"/>
-            <ac:spMk id="84" creationId="{00000000-0000-0000-0000-000000000000}"/>
-          </ac:spMkLst>
-        </pc:spChg>
-        <pc:picChg chg="add mod">
-          <ac:chgData name="Riccardo Berta" userId="c8694f89-bba4-4576-b0a8-456619ca5a8c" providerId="ADAL" clId="{FDDBFC5A-5EA9-5330-BEB8-433D7E3B4C4E}" dt="2025-09-03T07:49:10.604" v="1696" actId="1076"/>
-          <ac:picMkLst>
-            <pc:docMk/>
-            <pc:sldMk cId="4181844165" sldId="266"/>
-            <ac:picMk id="4" creationId="{97A6EF3D-A73D-E61E-3224-5CF29DA6E364}"/>
-          </ac:picMkLst>
-        </pc:picChg>
-        <pc:picChg chg="add mod">
-          <ac:chgData name="Riccardo Berta" userId="c8694f89-bba4-4576-b0a8-456619ca5a8c" providerId="ADAL" clId="{FDDBFC5A-5EA9-5330-BEB8-433D7E3B4C4E}" dt="2025-09-03T07:49:12.733" v="1697" actId="1076"/>
-          <ac:picMkLst>
-            <pc:docMk/>
-            <pc:sldMk cId="4181844165" sldId="266"/>
-            <ac:picMk id="5" creationId="{84B0DAB6-F29B-3235-D52A-AB445F667050}"/>
-          </ac:picMkLst>
-        </pc:picChg>
       </pc:sldChg>
       <pc:sldChg chg="addSp delSp modSp mod">
         <pc:chgData name="Riccardo Berta" userId="c8694f89-bba4-4576-b0a8-456619ca5a8c" providerId="ADAL" clId="{FDDBFC5A-5EA9-5330-BEB8-433D7E3B4C4E}" dt="2025-09-03T08:36:35.306" v="1917" actId="20577"/>
@@ -558,38 +383,6 @@
           <pc:docMk/>
           <pc:sldMk cId="216455838" sldId="267"/>
         </pc:sldMkLst>
-        <pc:spChg chg="mod">
-          <ac:chgData name="Riccardo Berta" userId="c8694f89-bba4-4576-b0a8-456619ca5a8c" providerId="ADAL" clId="{FDDBFC5A-5EA9-5330-BEB8-433D7E3B4C4E}" dt="2025-09-03T08:36:35.306" v="1917" actId="20577"/>
-          <ac:spMkLst>
-            <pc:docMk/>
-            <pc:sldMk cId="216455838" sldId="267"/>
-            <ac:spMk id="83" creationId="{00000000-0000-0000-0000-000000000000}"/>
-          </ac:spMkLst>
-        </pc:spChg>
-        <pc:spChg chg="mod">
-          <ac:chgData name="Riccardo Berta" userId="c8694f89-bba4-4576-b0a8-456619ca5a8c" providerId="ADAL" clId="{FDDBFC5A-5EA9-5330-BEB8-433D7E3B4C4E}" dt="2025-09-03T07:52:29.774" v="1708" actId="403"/>
-          <ac:spMkLst>
-            <pc:docMk/>
-            <pc:sldMk cId="216455838" sldId="267"/>
-            <ac:spMk id="84" creationId="{00000000-0000-0000-0000-000000000000}"/>
-          </ac:spMkLst>
-        </pc:spChg>
-        <pc:picChg chg="add mod">
-          <ac:chgData name="Riccardo Berta" userId="c8694f89-bba4-4576-b0a8-456619ca5a8c" providerId="ADAL" clId="{FDDBFC5A-5EA9-5330-BEB8-433D7E3B4C4E}" dt="2025-09-03T07:52:20.402" v="1700" actId="1076"/>
-          <ac:picMkLst>
-            <pc:docMk/>
-            <pc:sldMk cId="216455838" sldId="267"/>
-            <ac:picMk id="2" creationId="{8B4FCCE3-E523-741E-9C29-DB089F6D64CA}"/>
-          </ac:picMkLst>
-        </pc:picChg>
-        <pc:picChg chg="add mod">
-          <ac:chgData name="Riccardo Berta" userId="c8694f89-bba4-4576-b0a8-456619ca5a8c" providerId="ADAL" clId="{FDDBFC5A-5EA9-5330-BEB8-433D7E3B4C4E}" dt="2025-09-03T07:52:32.777" v="1709" actId="14100"/>
-          <ac:picMkLst>
-            <pc:docMk/>
-            <pc:sldMk cId="216455838" sldId="267"/>
-            <ac:picMk id="6" creationId="{DB759B7F-AB14-75D4-FE29-DE776D16C6E0}"/>
-          </ac:picMkLst>
-        </pc:picChg>
       </pc:sldChg>
       <pc:sldChg chg="addSp modSp mod">
         <pc:chgData name="Riccardo Berta" userId="c8694f89-bba4-4576-b0a8-456619ca5a8c" providerId="ADAL" clId="{FDDBFC5A-5EA9-5330-BEB8-433D7E3B4C4E}" dt="2025-09-03T08:36:48.979" v="1925" actId="20577"/>
@@ -597,38 +390,6 @@
           <pc:docMk/>
           <pc:sldMk cId="925286286" sldId="268"/>
         </pc:sldMkLst>
-        <pc:spChg chg="mod">
-          <ac:chgData name="Riccardo Berta" userId="c8694f89-bba4-4576-b0a8-456619ca5a8c" providerId="ADAL" clId="{FDDBFC5A-5EA9-5330-BEB8-433D7E3B4C4E}" dt="2025-09-03T08:36:48.979" v="1925" actId="20577"/>
-          <ac:spMkLst>
-            <pc:docMk/>
-            <pc:sldMk cId="925286286" sldId="268"/>
-            <ac:spMk id="83" creationId="{00000000-0000-0000-0000-000000000000}"/>
-          </ac:spMkLst>
-        </pc:spChg>
-        <pc:spChg chg="mod">
-          <ac:chgData name="Riccardo Berta" userId="c8694f89-bba4-4576-b0a8-456619ca5a8c" providerId="ADAL" clId="{FDDBFC5A-5EA9-5330-BEB8-433D7E3B4C4E}" dt="2025-09-03T08:27:16.543" v="1846" actId="20577"/>
-          <ac:spMkLst>
-            <pc:docMk/>
-            <pc:sldMk cId="925286286" sldId="268"/>
-            <ac:spMk id="84" creationId="{00000000-0000-0000-0000-000000000000}"/>
-          </ac:spMkLst>
-        </pc:spChg>
-        <pc:picChg chg="add mod">
-          <ac:chgData name="Riccardo Berta" userId="c8694f89-bba4-4576-b0a8-456619ca5a8c" providerId="ADAL" clId="{FDDBFC5A-5EA9-5330-BEB8-433D7E3B4C4E}" dt="2025-09-03T08:24:36.334" v="1844" actId="1076"/>
-          <ac:picMkLst>
-            <pc:docMk/>
-            <pc:sldMk cId="925286286" sldId="268"/>
-            <ac:picMk id="2" creationId="{B3967784-5627-5E4B-4A87-366A58D9382C}"/>
-          </ac:picMkLst>
-        </pc:picChg>
-        <pc:picChg chg="add mod">
-          <ac:chgData name="Riccardo Berta" userId="c8694f89-bba4-4576-b0a8-456619ca5a8c" providerId="ADAL" clId="{FDDBFC5A-5EA9-5330-BEB8-433D7E3B4C4E}" dt="2025-09-03T08:27:26.838" v="1850" actId="1076"/>
-          <ac:picMkLst>
-            <pc:docMk/>
-            <pc:sldMk cId="925286286" sldId="268"/>
-            <ac:picMk id="3" creationId="{C798EF0F-AC65-80B9-F2C5-5922B17B3CEE}"/>
-          </ac:picMkLst>
-        </pc:picChg>
       </pc:sldChg>
       <pc:sldChg chg="addSp modSp mod ord">
         <pc:chgData name="Riccardo Berta" userId="c8694f89-bba4-4576-b0a8-456619ca5a8c" providerId="ADAL" clId="{FDDBFC5A-5EA9-5330-BEB8-433D7E3B4C4E}" dt="2025-09-03T08:36:42.368" v="1921" actId="20577"/>
@@ -636,38 +397,6 @@
           <pc:docMk/>
           <pc:sldMk cId="3471997037" sldId="269"/>
         </pc:sldMkLst>
-        <pc:spChg chg="mod">
-          <ac:chgData name="Riccardo Berta" userId="c8694f89-bba4-4576-b0a8-456619ca5a8c" providerId="ADAL" clId="{FDDBFC5A-5EA9-5330-BEB8-433D7E3B4C4E}" dt="2025-09-03T08:36:42.368" v="1921" actId="20577"/>
-          <ac:spMkLst>
-            <pc:docMk/>
-            <pc:sldMk cId="3471997037" sldId="269"/>
-            <ac:spMk id="83" creationId="{00000000-0000-0000-0000-000000000000}"/>
-          </ac:spMkLst>
-        </pc:spChg>
-        <pc:spChg chg="mod">
-          <ac:chgData name="Riccardo Berta" userId="c8694f89-bba4-4576-b0a8-456619ca5a8c" providerId="ADAL" clId="{FDDBFC5A-5EA9-5330-BEB8-433D7E3B4C4E}" dt="2025-09-03T08:11:29.162" v="1839" actId="404"/>
-          <ac:spMkLst>
-            <pc:docMk/>
-            <pc:sldMk cId="3471997037" sldId="269"/>
-            <ac:spMk id="84" creationId="{00000000-0000-0000-0000-000000000000}"/>
-          </ac:spMkLst>
-        </pc:spChg>
-        <pc:picChg chg="add mod">
-          <ac:chgData name="Riccardo Berta" userId="c8694f89-bba4-4576-b0a8-456619ca5a8c" providerId="ADAL" clId="{FDDBFC5A-5EA9-5330-BEB8-433D7E3B4C4E}" dt="2025-09-03T08:11:16.361" v="1818" actId="1035"/>
-          <ac:picMkLst>
-            <pc:docMk/>
-            <pc:sldMk cId="3471997037" sldId="269"/>
-            <ac:picMk id="2" creationId="{E0E55011-3024-F6CC-F822-A4DF3B2030C2}"/>
-          </ac:picMkLst>
-        </pc:picChg>
-        <pc:picChg chg="add mod">
-          <ac:chgData name="Riccardo Berta" userId="c8694f89-bba4-4576-b0a8-456619ca5a8c" providerId="ADAL" clId="{FDDBFC5A-5EA9-5330-BEB8-433D7E3B4C4E}" dt="2025-09-03T08:11:16.361" v="1818" actId="1035"/>
-          <ac:picMkLst>
-            <pc:docMk/>
-            <pc:sldMk cId="3471997037" sldId="269"/>
-            <ac:picMk id="3" creationId="{C6B43E3F-54E2-E4C0-6F8F-D90BBDFBA16C}"/>
-          </ac:picMkLst>
-        </pc:picChg>
       </pc:sldChg>
       <pc:sldChg chg="del">
         <pc:chgData name="Riccardo Berta" userId="c8694f89-bba4-4576-b0a8-456619ca5a8c" providerId="ADAL" clId="{FDDBFC5A-5EA9-5330-BEB8-433D7E3B4C4E}" dt="2025-09-02T15:59:58.446" v="1058" actId="2696"/>
@@ -677,29 +406,13 @@
         </pc:sldMkLst>
       </pc:sldChg>
       <pc:sldChg chg="addSp modSp mod ord">
-        <pc:chgData name="Riccardo Berta" userId="c8694f89-bba4-4576-b0a8-456619ca5a8c" providerId="ADAL" clId="{FDDBFC5A-5EA9-5330-BEB8-433D7E3B4C4E}" dt="2025-09-03T10:40:17.436" v="2133" actId="1076"/>
+        <pc:chgData name="Riccardo Berta" userId="c8694f89-bba4-4576-b0a8-456619ca5a8c" providerId="ADAL" clId="{FDDBFC5A-5EA9-5330-BEB8-433D7E3B4C4E}" dt="2025-10-06T05:59:42.279" v="2805" actId="1036"/>
         <pc:sldMkLst>
           <pc:docMk/>
           <pc:sldMk cId="2266699268" sldId="271"/>
         </pc:sldMkLst>
-        <pc:spChg chg="mod">
-          <ac:chgData name="Riccardo Berta" userId="c8694f89-bba4-4576-b0a8-456619ca5a8c" providerId="ADAL" clId="{FDDBFC5A-5EA9-5330-BEB8-433D7E3B4C4E}" dt="2025-09-03T10:10:21.970" v="1972"/>
-          <ac:spMkLst>
-            <pc:docMk/>
-            <pc:sldMk cId="2266699268" sldId="271"/>
-            <ac:spMk id="83" creationId="{00000000-0000-0000-0000-000000000000}"/>
-          </ac:spMkLst>
-        </pc:spChg>
-        <pc:spChg chg="mod">
-          <ac:chgData name="Riccardo Berta" userId="c8694f89-bba4-4576-b0a8-456619ca5a8c" providerId="ADAL" clId="{FDDBFC5A-5EA9-5330-BEB8-433D7E3B4C4E}" dt="2025-09-03T10:16:08.379" v="2129" actId="20577"/>
-          <ac:spMkLst>
-            <pc:docMk/>
-            <pc:sldMk cId="2266699268" sldId="271"/>
-            <ac:spMk id="84" creationId="{00000000-0000-0000-0000-000000000000}"/>
-          </ac:spMkLst>
-        </pc:spChg>
         <pc:picChg chg="add mod">
-          <ac:chgData name="Riccardo Berta" userId="c8694f89-bba4-4576-b0a8-456619ca5a8c" providerId="ADAL" clId="{FDDBFC5A-5EA9-5330-BEB8-433D7E3B4C4E}" dt="2025-09-03T10:40:17.436" v="2133" actId="1076"/>
+          <ac:chgData name="Riccardo Berta" userId="c8694f89-bba4-4576-b0a8-456619ca5a8c" providerId="ADAL" clId="{FDDBFC5A-5EA9-5330-BEB8-433D7E3B4C4E}" dt="2025-10-06T05:59:42.279" v="2805" actId="1036"/>
           <ac:picMkLst>
             <pc:docMk/>
             <pc:sldMk cId="2266699268" sldId="271"/>
@@ -720,38 +433,6 @@
           <pc:docMk/>
           <pc:sldMk cId="3084049364" sldId="274"/>
         </pc:sldMkLst>
-        <pc:spChg chg="mod">
-          <ac:chgData name="Riccardo Berta" userId="c8694f89-bba4-4576-b0a8-456619ca5a8c" providerId="ADAL" clId="{FDDBFC5A-5EA9-5330-BEB8-433D7E3B4C4E}" dt="2025-09-03T08:36:59.023" v="1929" actId="20577"/>
-          <ac:spMkLst>
-            <pc:docMk/>
-            <pc:sldMk cId="3084049364" sldId="274"/>
-            <ac:spMk id="83" creationId="{00000000-0000-0000-0000-000000000000}"/>
-          </ac:spMkLst>
-        </pc:spChg>
-        <pc:spChg chg="mod">
-          <ac:chgData name="Riccardo Berta" userId="c8694f89-bba4-4576-b0a8-456619ca5a8c" providerId="ADAL" clId="{FDDBFC5A-5EA9-5330-BEB8-433D7E3B4C4E}" dt="2025-09-03T08:34:48.636" v="1890" actId="20577"/>
-          <ac:spMkLst>
-            <pc:docMk/>
-            <pc:sldMk cId="3084049364" sldId="274"/>
-            <ac:spMk id="84" creationId="{00000000-0000-0000-0000-000000000000}"/>
-          </ac:spMkLst>
-        </pc:spChg>
-        <pc:picChg chg="add mod">
-          <ac:chgData name="Riccardo Berta" userId="c8694f89-bba4-4576-b0a8-456619ca5a8c" providerId="ADAL" clId="{FDDBFC5A-5EA9-5330-BEB8-433D7E3B4C4E}" dt="2025-09-03T08:35:05.616" v="1892" actId="1076"/>
-          <ac:picMkLst>
-            <pc:docMk/>
-            <pc:sldMk cId="3084049364" sldId="274"/>
-            <ac:picMk id="2" creationId="{D78FC19A-AD98-00D6-0359-170D9740B0E4}"/>
-          </ac:picMkLst>
-        </pc:picChg>
-        <pc:picChg chg="add mod">
-          <ac:chgData name="Riccardo Berta" userId="c8694f89-bba4-4576-b0a8-456619ca5a8c" providerId="ADAL" clId="{FDDBFC5A-5EA9-5330-BEB8-433D7E3B4C4E}" dt="2025-09-03T08:34:46.576" v="1886" actId="1076"/>
-          <ac:picMkLst>
-            <pc:docMk/>
-            <pc:sldMk cId="3084049364" sldId="274"/>
-            <ac:picMk id="5" creationId="{FB87FFEB-79C0-E3F7-4AF5-D0EC708E437D}"/>
-          </ac:picMkLst>
-        </pc:picChg>
       </pc:sldChg>
       <pc:sldChg chg="addSp delSp modSp del mod">
         <pc:chgData name="Riccardo Berta" userId="c8694f89-bba4-4576-b0a8-456619ca5a8c" providerId="ADAL" clId="{FDDBFC5A-5EA9-5330-BEB8-433D7E3B4C4E}" dt="2025-09-03T12:49:05.390" v="2765" actId="2696"/>
@@ -773,23 +454,15 @@
           <pc:docMk/>
           <pc:sldMk cId="451037675" sldId="278"/>
         </pc:sldMkLst>
-        <pc:spChg chg="mod">
-          <ac:chgData name="Riccardo Berta" userId="c8694f89-bba4-4576-b0a8-456619ca5a8c" providerId="ADAL" clId="{FDDBFC5A-5EA9-5330-BEB8-433D7E3B4C4E}" dt="2025-09-03T10:58:39.273" v="2224" actId="113"/>
-          <ac:spMkLst>
-            <pc:docMk/>
-            <pc:sldMk cId="451037675" sldId="278"/>
-            <ac:spMk id="84" creationId="{00000000-0000-0000-0000-000000000000}"/>
-          </ac:spMkLst>
-        </pc:spChg>
       </pc:sldChg>
       <pc:sldChg chg="modSp mod">
-        <pc:chgData name="Riccardo Berta" userId="c8694f89-bba4-4576-b0a8-456619ca5a8c" providerId="ADAL" clId="{FDDBFC5A-5EA9-5330-BEB8-433D7E3B4C4E}" dt="2025-09-03T11:04:03.299" v="2335" actId="20577"/>
+        <pc:chgData name="Riccardo Berta" userId="c8694f89-bba4-4576-b0a8-456619ca5a8c" providerId="ADAL" clId="{FDDBFC5A-5EA9-5330-BEB8-433D7E3B4C4E}" dt="2025-10-08T09:51:44.189" v="2923" actId="20577"/>
         <pc:sldMkLst>
           <pc:docMk/>
           <pc:sldMk cId="4057162192" sldId="279"/>
         </pc:sldMkLst>
         <pc:spChg chg="mod">
-          <ac:chgData name="Riccardo Berta" userId="c8694f89-bba4-4576-b0a8-456619ca5a8c" providerId="ADAL" clId="{FDDBFC5A-5EA9-5330-BEB8-433D7E3B4C4E}" dt="2025-09-03T11:04:03.299" v="2335" actId="20577"/>
+          <ac:chgData name="Riccardo Berta" userId="c8694f89-bba4-4576-b0a8-456619ca5a8c" providerId="ADAL" clId="{FDDBFC5A-5EA9-5330-BEB8-433D7E3B4C4E}" dt="2025-10-08T09:49:25.614" v="2820" actId="20577"/>
           <ac:spMkLst>
             <pc:docMk/>
             <pc:sldMk cId="4057162192" sldId="279"/>
@@ -797,7 +470,7 @@
           </ac:spMkLst>
         </pc:spChg>
         <pc:spChg chg="mod">
-          <ac:chgData name="Riccardo Berta" userId="c8694f89-bba4-4576-b0a8-456619ca5a8c" providerId="ADAL" clId="{FDDBFC5A-5EA9-5330-BEB8-433D7E3B4C4E}" dt="2025-09-03T11:03:58.427" v="2331" actId="404"/>
+          <ac:chgData name="Riccardo Berta" userId="c8694f89-bba4-4576-b0a8-456619ca5a8c" providerId="ADAL" clId="{FDDBFC5A-5EA9-5330-BEB8-433D7E3B4C4E}" dt="2025-10-08T09:51:44.189" v="2923" actId="20577"/>
           <ac:spMkLst>
             <pc:docMk/>
             <pc:sldMk cId="4057162192" sldId="279"/>
@@ -813,41 +486,17 @@
         </pc:sldMkLst>
       </pc:sldChg>
       <pc:sldChg chg="addSp delSp modSp mod">
-        <pc:chgData name="Riccardo Berta" userId="c8694f89-bba4-4576-b0a8-456619ca5a8c" providerId="ADAL" clId="{FDDBFC5A-5EA9-5330-BEB8-433D7E3B4C4E}" dt="2025-09-04T06:09:03.775" v="2772" actId="14100"/>
+        <pc:chgData name="Riccardo Berta" userId="c8694f89-bba4-4576-b0a8-456619ca5a8c" providerId="ADAL" clId="{FDDBFC5A-5EA9-5330-BEB8-433D7E3B4C4E}" dt="2025-10-06T06:05:16.265" v="2809" actId="1036"/>
         <pc:sldMkLst>
           <pc:docMk/>
           <pc:sldMk cId="3900298855" sldId="281"/>
         </pc:sldMkLst>
-        <pc:spChg chg="mod">
-          <ac:chgData name="Riccardo Berta" userId="c8694f89-bba4-4576-b0a8-456619ca5a8c" providerId="ADAL" clId="{FDDBFC5A-5EA9-5330-BEB8-433D7E3B4C4E}" dt="2025-09-03T12:15:49.813" v="2689" actId="403"/>
-          <ac:spMkLst>
-            <pc:docMk/>
-            <pc:sldMk cId="3900298855" sldId="281"/>
-            <ac:spMk id="84" creationId="{00000000-0000-0000-0000-000000000000}"/>
-          </ac:spMkLst>
-        </pc:spChg>
-        <pc:picChg chg="add mod">
-          <ac:chgData name="Riccardo Berta" userId="c8694f89-bba4-4576-b0a8-456619ca5a8c" providerId="ADAL" clId="{FDDBFC5A-5EA9-5330-BEB8-433D7E3B4C4E}" dt="2025-09-03T12:15:32.211" v="2684" actId="1076"/>
+        <pc:picChg chg="mod">
+          <ac:chgData name="Riccardo Berta" userId="c8694f89-bba4-4576-b0a8-456619ca5a8c" providerId="ADAL" clId="{FDDBFC5A-5EA9-5330-BEB8-433D7E3B4C4E}" dt="2025-10-06T06:05:16.265" v="2809" actId="1036"/>
           <ac:picMkLst>
             <pc:docMk/>
             <pc:sldMk cId="3900298855" sldId="281"/>
             <ac:picMk id="2" creationId="{F1D7BA78-FAF3-08C1-6006-F53433B1AF62}"/>
-          </ac:picMkLst>
-        </pc:picChg>
-        <pc:picChg chg="add mod">
-          <ac:chgData name="Riccardo Berta" userId="c8694f89-bba4-4576-b0a8-456619ca5a8c" providerId="ADAL" clId="{FDDBFC5A-5EA9-5330-BEB8-433D7E3B4C4E}" dt="2025-09-03T12:15:52.238" v="2690" actId="1076"/>
-          <ac:picMkLst>
-            <pc:docMk/>
-            <pc:sldMk cId="3900298855" sldId="281"/>
-            <ac:picMk id="6" creationId="{F754BA3B-862A-C96F-40A7-A875FF9DBEBE}"/>
-          </ac:picMkLst>
-        </pc:picChg>
-        <pc:picChg chg="add mod">
-          <ac:chgData name="Riccardo Berta" userId="c8694f89-bba4-4576-b0a8-456619ca5a8c" providerId="ADAL" clId="{FDDBFC5A-5EA9-5330-BEB8-433D7E3B4C4E}" dt="2025-09-04T06:09:03.775" v="2772" actId="14100"/>
-          <ac:picMkLst>
-            <pc:docMk/>
-            <pc:sldMk cId="3900298855" sldId="281"/>
-            <ac:picMk id="7" creationId="{17794C13-0708-6CF0-17DB-F0CE04F87EF4}"/>
           </ac:picMkLst>
         </pc:picChg>
       </pc:sldChg>
@@ -864,30 +513,6 @@
           <pc:docMk/>
           <pc:sldMk cId="1326630385" sldId="283"/>
         </pc:sldMkLst>
-        <pc:spChg chg="mod">
-          <ac:chgData name="Riccardo Berta" userId="c8694f89-bba4-4576-b0a8-456619ca5a8c" providerId="ADAL" clId="{FDDBFC5A-5EA9-5330-BEB8-433D7E3B4C4E}" dt="2025-09-03T12:16:02.424" v="2693" actId="20577"/>
-          <ac:spMkLst>
-            <pc:docMk/>
-            <pc:sldMk cId="1326630385" sldId="283"/>
-            <ac:spMk id="83" creationId="{00000000-0000-0000-0000-000000000000}"/>
-          </ac:spMkLst>
-        </pc:spChg>
-        <pc:spChg chg="mod">
-          <ac:chgData name="Riccardo Berta" userId="c8694f89-bba4-4576-b0a8-456619ca5a8c" providerId="ADAL" clId="{FDDBFC5A-5EA9-5330-BEB8-433D7E3B4C4E}" dt="2025-09-03T12:21:06.481" v="2715" actId="20577"/>
-          <ac:spMkLst>
-            <pc:docMk/>
-            <pc:sldMk cId="1326630385" sldId="283"/>
-            <ac:spMk id="84" creationId="{00000000-0000-0000-0000-000000000000}"/>
-          </ac:spMkLst>
-        </pc:spChg>
-        <pc:picChg chg="add mod">
-          <ac:chgData name="Riccardo Berta" userId="c8694f89-bba4-4576-b0a8-456619ca5a8c" providerId="ADAL" clId="{FDDBFC5A-5EA9-5330-BEB8-433D7E3B4C4E}" dt="2025-09-03T12:20:57.324" v="2700" actId="1076"/>
-          <ac:picMkLst>
-            <pc:docMk/>
-            <pc:sldMk cId="1326630385" sldId="283"/>
-            <ac:picMk id="4" creationId="{3C0C434E-1CC5-3A2C-396B-74DF4971EEDB}"/>
-          </ac:picMkLst>
-        </pc:picChg>
       </pc:sldChg>
       <pc:sldChg chg="addSp delSp modSp mod">
         <pc:chgData name="Riccardo Berta" userId="c8694f89-bba4-4576-b0a8-456619ca5a8c" providerId="ADAL" clId="{FDDBFC5A-5EA9-5330-BEB8-433D7E3B4C4E}" dt="2025-09-03T10:54:39.176" v="2218" actId="20577"/>
@@ -895,22 +520,6 @@
           <pc:docMk/>
           <pc:sldMk cId="265439497" sldId="285"/>
         </pc:sldMkLst>
-        <pc:spChg chg="mod">
-          <ac:chgData name="Riccardo Berta" userId="c8694f89-bba4-4576-b0a8-456619ca5a8c" providerId="ADAL" clId="{FDDBFC5A-5EA9-5330-BEB8-433D7E3B4C4E}" dt="2025-09-03T10:54:39.176" v="2218" actId="20577"/>
-          <ac:spMkLst>
-            <pc:docMk/>
-            <pc:sldMk cId="265439497" sldId="285"/>
-            <ac:spMk id="84" creationId="{00000000-0000-0000-0000-000000000000}"/>
-          </ac:spMkLst>
-        </pc:spChg>
-        <pc:picChg chg="add mod">
-          <ac:chgData name="Riccardo Berta" userId="c8694f89-bba4-4576-b0a8-456619ca5a8c" providerId="ADAL" clId="{FDDBFC5A-5EA9-5330-BEB8-433D7E3B4C4E}" dt="2025-09-03T10:54:36.424" v="2217" actId="1076"/>
-          <ac:picMkLst>
-            <pc:docMk/>
-            <pc:sldMk cId="265439497" sldId="285"/>
-            <ac:picMk id="2" creationId="{BA34A385-508D-AB2C-CCFB-9CD601B0393F}"/>
-          </ac:picMkLst>
-        </pc:picChg>
       </pc:sldChg>
       <pc:sldChg chg="addSp delSp modSp add mod">
         <pc:chgData name="Riccardo Berta" userId="c8694f89-bba4-4576-b0a8-456619ca5a8c" providerId="ADAL" clId="{FDDBFC5A-5EA9-5330-BEB8-433D7E3B4C4E}" dt="2025-10-03T05:37:59.376" v="2781" actId="1076"/>
@@ -918,14 +527,6 @@
           <pc:docMk/>
           <pc:sldMk cId="2143069171" sldId="286"/>
         </pc:sldMkLst>
-        <pc:picChg chg="add del mod">
-          <ac:chgData name="Riccardo Berta" userId="c8694f89-bba4-4576-b0a8-456619ca5a8c" providerId="ADAL" clId="{FDDBFC5A-5EA9-5330-BEB8-433D7E3B4C4E}" dt="2025-10-03T05:37:53.532" v="2778" actId="478"/>
-          <ac:picMkLst>
-            <pc:docMk/>
-            <pc:sldMk cId="2143069171" sldId="286"/>
-            <ac:picMk id="2" creationId="{DF4B3D43-0277-2E84-B85A-AC3E3B4706A7}"/>
-          </ac:picMkLst>
-        </pc:picChg>
         <pc:picChg chg="add mod">
           <ac:chgData name="Riccardo Berta" userId="c8694f89-bba4-4576-b0a8-456619ca5a8c" providerId="ADAL" clId="{FDDBFC5A-5EA9-5330-BEB8-433D7E3B4C4E}" dt="2025-10-03T05:37:59.376" v="2781" actId="1076"/>
           <ac:picMkLst>
@@ -941,14 +542,6 @@
           <pc:docMk/>
           <pc:sldMk cId="1916596512" sldId="287"/>
         </pc:sldMkLst>
-        <pc:spChg chg="add mod">
-          <ac:chgData name="Riccardo Berta" userId="c8694f89-bba4-4576-b0a8-456619ca5a8c" providerId="ADAL" clId="{FDDBFC5A-5EA9-5330-BEB8-433D7E3B4C4E}" dt="2025-09-05T15:08:44.065" v="2777" actId="122"/>
-          <ac:spMkLst>
-            <pc:docMk/>
-            <pc:sldMk cId="1916596512" sldId="287"/>
-            <ac:spMk id="3" creationId="{4474B5C4-D64A-3E47-0D38-BCC373BDE890}"/>
-          </ac:spMkLst>
-        </pc:spChg>
       </pc:sldChg>
       <pc:sldChg chg="new del">
         <pc:chgData name="Riccardo Berta" userId="c8694f89-bba4-4576-b0a8-456619ca5a8c" providerId="ADAL" clId="{FDDBFC5A-5EA9-5330-BEB8-433D7E3B4C4E}" dt="2025-09-03T06:32:19.873" v="1414" actId="2696"/>
@@ -964,20 +557,35 @@
           <pc:sldMk cId="2720781894" sldId="287"/>
         </pc:sldMkLst>
       </pc:sldChg>
+      <pc:sldChg chg="modSp add mod">
+        <pc:chgData name="Riccardo Berta" userId="c8694f89-bba4-4576-b0a8-456619ca5a8c" providerId="ADAL" clId="{FDDBFC5A-5EA9-5330-BEB8-433D7E3B4C4E}" dt="2025-10-08T09:49:42.921" v="2823" actId="6549"/>
+        <pc:sldMkLst>
+          <pc:docMk/>
+          <pc:sldMk cId="1119572588" sldId="288"/>
+        </pc:sldMkLst>
+        <pc:spChg chg="mod">
+          <ac:chgData name="Riccardo Berta" userId="c8694f89-bba4-4576-b0a8-456619ca5a8c" providerId="ADAL" clId="{FDDBFC5A-5EA9-5330-BEB8-433D7E3B4C4E}" dt="2025-10-08T09:49:19.305" v="2814" actId="20577"/>
+          <ac:spMkLst>
+            <pc:docMk/>
+            <pc:sldMk cId="1119572588" sldId="288"/>
+            <ac:spMk id="83" creationId="{41A5D1EC-9D91-C4C8-0FD2-D2534FD9362F}"/>
+          </ac:spMkLst>
+        </pc:spChg>
+        <pc:spChg chg="mod">
+          <ac:chgData name="Riccardo Berta" userId="c8694f89-bba4-4576-b0a8-456619ca5a8c" providerId="ADAL" clId="{FDDBFC5A-5EA9-5330-BEB8-433D7E3B4C4E}" dt="2025-10-08T09:49:42.921" v="2823" actId="6549"/>
+          <ac:spMkLst>
+            <pc:docMk/>
+            <pc:sldMk cId="1119572588" sldId="288"/>
+            <ac:spMk id="84" creationId="{5476FE44-C747-FD24-7A78-980E4F0B8055}"/>
+          </ac:spMkLst>
+        </pc:spChg>
+      </pc:sldChg>
       <pc:sldMasterChg chg="modSp mod modSldLayout">
         <pc:chgData name="Riccardo Berta" userId="c8694f89-bba4-4576-b0a8-456619ca5a8c" providerId="ADAL" clId="{FDDBFC5A-5EA9-5330-BEB8-433D7E3B4C4E}" dt="2025-09-03T06:31:35.367" v="1399" actId="948"/>
         <pc:sldMasterMkLst>
           <pc:docMk/>
           <pc:sldMasterMk cId="0" sldId="2147483659"/>
         </pc:sldMasterMkLst>
-        <pc:spChg chg="mod">
-          <ac:chgData name="Riccardo Berta" userId="c8694f89-bba4-4576-b0a8-456619ca5a8c" providerId="ADAL" clId="{FDDBFC5A-5EA9-5330-BEB8-433D7E3B4C4E}" dt="2025-09-03T06:31:35.367" v="1399" actId="948"/>
-          <ac:spMkLst>
-            <pc:docMk/>
-            <pc:sldMasterMk cId="0" sldId="2147483659"/>
-            <ac:spMk id="7" creationId="{00000000-0000-0000-0000-000000000000}"/>
-          </ac:spMkLst>
-        </pc:spChg>
         <pc:sldLayoutChg chg="modSp mod">
           <pc:chgData name="Riccardo Berta" userId="c8694f89-bba4-4576-b0a8-456619ca5a8c" providerId="ADAL" clId="{FDDBFC5A-5EA9-5330-BEB8-433D7E3B4C4E}" dt="2025-09-03T06:31:14.728" v="1398" actId="948"/>
           <pc:sldLayoutMkLst>
@@ -985,15 +593,6 @@
             <pc:sldMasterMk cId="0" sldId="2147483659"/>
             <pc:sldLayoutMk cId="0" sldId="2147483650"/>
           </pc:sldLayoutMkLst>
-          <pc:spChg chg="mod">
-            <ac:chgData name="Riccardo Berta" userId="c8694f89-bba4-4576-b0a8-456619ca5a8c" providerId="ADAL" clId="{FDDBFC5A-5EA9-5330-BEB8-433D7E3B4C4E}" dt="2025-09-03T06:31:14.728" v="1398" actId="948"/>
-            <ac:spMkLst>
-              <pc:docMk/>
-              <pc:sldMasterMk cId="0" sldId="2147483659"/>
-              <pc:sldLayoutMk cId="0" sldId="2147483650"/>
-              <ac:spMk id="23" creationId="{00000000-0000-0000-0000-000000000000}"/>
-            </ac:spMkLst>
-          </pc:spChg>
         </pc:sldLayoutChg>
       </pc:sldMasterChg>
     </pc:docChg>
@@ -3088,7 +2687,13 @@
   <p:cSld>
     <p:spTree>
       <p:nvGrpSpPr>
-        <p:cNvPr id="1" name="Shape 79"/>
+        <p:cNvPr id="1" name="Shape 79">
+          <a:extLst>
+            <a:ext uri="{FF2B5EF4-FFF2-40B4-BE49-F238E27FC236}">
+              <a16:creationId xmlns:a16="http://schemas.microsoft.com/office/drawing/2014/main" id="{1BCBC421-E6C5-D7B1-15D0-C58D3C28334B}"/>
+            </a:ext>
+          </a:extLst>
+        </p:cNvPr>
         <p:cNvGrpSpPr/>
         <p:nvPr/>
       </p:nvGrpSpPr>
@@ -3102,7 +2707,13 @@
       </p:grpSpPr>
       <p:sp>
         <p:nvSpPr>
-          <p:cNvPr id="80" name="Google Shape;80;geed6aedbf_0_0:notes"/>
+          <p:cNvPr id="80" name="Google Shape;80;geed6aedbf_0_0:notes">
+            <a:extLst>
+              <a:ext uri="{FF2B5EF4-FFF2-40B4-BE49-F238E27FC236}">
+                <a16:creationId xmlns:a16="http://schemas.microsoft.com/office/drawing/2014/main" id="{B2F92D82-AD73-BC41-FB9F-2679AA247D4E}"/>
+              </a:ext>
+            </a:extLst>
+          </p:cNvPr>
           <p:cNvSpPr>
             <a:spLocks noGrp="1" noRot="1" noChangeAspect="1"/>
           </p:cNvSpPr>
@@ -3143,7 +2754,13 @@
       </p:sp>
       <p:sp>
         <p:nvSpPr>
-          <p:cNvPr id="81" name="Google Shape;81;geed6aedbf_0_0:notes"/>
+          <p:cNvPr id="81" name="Google Shape;81;geed6aedbf_0_0:notes">
+            <a:extLst>
+              <a:ext uri="{FF2B5EF4-FFF2-40B4-BE49-F238E27FC236}">
+                <a16:creationId xmlns:a16="http://schemas.microsoft.com/office/drawing/2014/main" id="{D89CD6E0-DB13-8A5C-C206-D5ABB9DE26DB}"/>
+              </a:ext>
+            </a:extLst>
+          </p:cNvPr>
           <p:cNvSpPr txBox="1">
             <a:spLocks noGrp="1"/>
           </p:cNvSpPr>
@@ -3182,7 +2799,7 @@
     </p:spTree>
     <p:extLst>
       <p:ext uri="{BB962C8B-B14F-4D97-AF65-F5344CB8AC3E}">
-        <p14:creationId xmlns:p14="http://schemas.microsoft.com/office/powerpoint/2010/main" val="1848758"/>
+        <p14:creationId xmlns:p14="http://schemas.microsoft.com/office/powerpoint/2010/main" val="3705685554"/>
       </p:ext>
     </p:extLst>
   </p:cSld>
@@ -3297,6 +2914,115 @@
 </file>
 
 <file path=ppt/notesSlides/notesSlide20.xml><?xml version="1.0" encoding="utf-8"?>
+<p:notes xmlns:a="http://schemas.openxmlformats.org/drawingml/2006/main" xmlns:r="http://schemas.openxmlformats.org/officeDocument/2006/relationships" xmlns:p="http://schemas.openxmlformats.org/presentationml/2006/main" showMasterSp="0" showMasterPhAnim="0">
+  <p:cSld>
+    <p:spTree>
+      <p:nvGrpSpPr>
+        <p:cNvPr id="1" name="Shape 79"/>
+        <p:cNvGrpSpPr/>
+        <p:nvPr/>
+      </p:nvGrpSpPr>
+      <p:grpSpPr>
+        <a:xfrm>
+          <a:off x="0" y="0"/>
+          <a:ext cx="0" cy="0"/>
+          <a:chOff x="0" y="0"/>
+          <a:chExt cx="0" cy="0"/>
+        </a:xfrm>
+      </p:grpSpPr>
+      <p:sp>
+        <p:nvSpPr>
+          <p:cNvPr id="80" name="Google Shape;80;geed6aedbf_0_0:notes"/>
+          <p:cNvSpPr>
+            <a:spLocks noGrp="1" noRot="1" noChangeAspect="1"/>
+          </p:cNvSpPr>
+          <p:nvPr>
+            <p:ph type="sldImg" idx="2"/>
+          </p:nvPr>
+        </p:nvSpPr>
+        <p:spPr>
+          <a:xfrm>
+            <a:off x="1143000" y="685800"/>
+            <a:ext cx="4572000" cy="3429000"/>
+          </a:xfrm>
+          <a:custGeom>
+            <a:avLst/>
+            <a:gdLst/>
+            <a:ahLst/>
+            <a:cxnLst/>
+            <a:rect l="l" t="t" r="r" b="b"/>
+            <a:pathLst>
+              <a:path w="120000" h="120000" extrusionOk="0">
+                <a:moveTo>
+                  <a:pt x="0" y="0"/>
+                </a:moveTo>
+                <a:lnTo>
+                  <a:pt x="120000" y="0"/>
+                </a:lnTo>
+                <a:lnTo>
+                  <a:pt x="120000" y="120000"/>
+                </a:lnTo>
+                <a:lnTo>
+                  <a:pt x="0" y="120000"/>
+                </a:lnTo>
+                <a:close/>
+              </a:path>
+            </a:pathLst>
+          </a:custGeom>
+        </p:spPr>
+      </p:sp>
+      <p:sp>
+        <p:nvSpPr>
+          <p:cNvPr id="81" name="Google Shape;81;geed6aedbf_0_0:notes"/>
+          <p:cNvSpPr txBox="1">
+            <a:spLocks noGrp="1"/>
+          </p:cNvSpPr>
+          <p:nvPr>
+            <p:ph type="body" idx="1"/>
+          </p:nvPr>
+        </p:nvSpPr>
+        <p:spPr>
+          <a:xfrm>
+            <a:off x="685800" y="4343400"/>
+            <a:ext cx="5486400" cy="4114800"/>
+          </a:xfrm>
+          <a:prstGeom prst="rect">
+            <a:avLst/>
+          </a:prstGeom>
+        </p:spPr>
+        <p:txBody>
+          <a:bodyPr spcFirstLastPara="1" wrap="square" lIns="91425" tIns="91425" rIns="91425" bIns="91425" anchor="t" anchorCtr="0">
+            <a:noAutofit/>
+          </a:bodyPr>
+          <a:lstStyle/>
+          <a:p>
+            <a:pPr marL="0" lvl="0" indent="0" algn="l" rtl="0">
+              <a:spcBef>
+                <a:spcPts val="0"/>
+              </a:spcBef>
+              <a:spcAft>
+                <a:spcPts val="0"/>
+              </a:spcAft>
+              <a:buNone/>
+            </a:pPr>
+            <a:endParaRPr/>
+          </a:p>
+        </p:txBody>
+      </p:sp>
+    </p:spTree>
+    <p:extLst>
+      <p:ext uri="{BB962C8B-B14F-4D97-AF65-F5344CB8AC3E}">
+        <p14:creationId xmlns:p14="http://schemas.microsoft.com/office/powerpoint/2010/main" val="1848758"/>
+      </p:ext>
+    </p:extLst>
+  </p:cSld>
+  <p:clrMapOvr>
+    <a:masterClrMapping/>
+  </p:clrMapOvr>
+</p:notes>
+</file>
+
+<file path=ppt/notesSlides/notesSlide21.xml><?xml version="1.0" encoding="utf-8"?>
 <p:notes xmlns:a="http://schemas.openxmlformats.org/drawingml/2006/main" xmlns:r="http://schemas.openxmlformats.org/officeDocument/2006/relationships" xmlns:p="http://schemas.openxmlformats.org/presentationml/2006/main" showMasterSp="0" showMasterPhAnim="0">
   <p:cSld>
     <p:spTree>
@@ -11308,8 +11034,8 @@
         </p:blipFill>
         <p:spPr>
           <a:xfrm>
-            <a:off x="404889" y="3850866"/>
-            <a:ext cx="8334221" cy="1563816"/>
+            <a:off x="64229" y="3877760"/>
+            <a:ext cx="8960390" cy="1681309"/>
           </a:xfrm>
           <a:prstGeom prst="rect">
             <a:avLst/>
@@ -11873,7 +11599,7 @@
             </a:pPr>
             <a:r>
               <a:rPr lang="en-GB" dirty="0"/>
-              <a:t>Fixed-Point Number Systems</a:t>
+              <a:t>Fixed-Point Number Systems (1)</a:t>
             </a:r>
             <a:endParaRPr dirty="0"/>
           </a:p>
@@ -12037,18 +11763,26 @@
             </a:r>
           </a:p>
           <a:p>
-            <a:endParaRPr lang="en-GB" sz="500" dirty="0"/>
-          </a:p>
-          <a:p>
-            <a:r>
-              <a:rPr lang="en-GB" dirty="0"/>
-              <a:t>Notice that fixed-point numbers are </a:t>
-            </a:r>
-            <a:r>
-              <a:rPr lang="en-GB" b="1" dirty="0"/>
-              <a:t>just a collection of bits</a:t>
-            </a:r>
+            <a:pPr lvl="2">
+              <a:lnSpc>
+                <a:spcPct val="100000"/>
+              </a:lnSpc>
+              <a:spcBef>
+                <a:spcPts val="0"/>
+              </a:spcBef>
+            </a:pPr>
             <a:endParaRPr lang="en-GB" dirty="0"/>
+          </a:p>
+          <a:p>
+            <a:pPr>
+              <a:lnSpc>
+                <a:spcPct val="100000"/>
+              </a:lnSpc>
+            </a:pPr>
+            <a:r>
+              <a:rPr lang="en-GB" dirty="0"/>
+              <a:t>Even though any integer number can be written as a sum of powers of two:</a:t>
+            </a:r>
           </a:p>
           <a:p>
             <a:pPr lvl="1">
@@ -12058,11 +11792,22 @@
             </a:pPr>
             <a:r>
               <a:rPr lang="en-GB" dirty="0"/>
-              <a:t>there is </a:t>
+              <a:t>$78 = 64 + 8 + 4 + 2 = 2^6 + 2^3 + 2^2 + 2^1$</a:t>
+            </a:r>
+          </a:p>
+          <a:p>
+            <a:pPr>
+              <a:lnSpc>
+                <a:spcPct val="100000"/>
+              </a:lnSpc>
+            </a:pPr>
+            <a:r>
+              <a:rPr lang="en-GB" dirty="0"/>
+              <a:t>Decimal fractions are </a:t>
             </a:r>
             <a:r>
               <a:rPr lang="en-GB" b="1" dirty="0"/>
-              <a:t>no way of knowing the existence of the binary point </a:t>
+              <a:t>rarely exact in binary:</a:t>
             </a:r>
           </a:p>
           <a:p>
@@ -12073,13 +11818,7 @@
             </a:pPr>
             <a:r>
               <a:rPr lang="en-GB" dirty="0"/>
-              <a:t>only through agreement of those people interpreting the number</a:t>
-            </a:r>
-          </a:p>
-          <a:p>
-            <a:r>
-              <a:rPr lang="en-GB" dirty="0"/>
-              <a:t>Standard formats </a:t>
+              <a:t>0.78 = 0.11000100100001111110…</a:t>
             </a:r>
           </a:p>
           <a:p>
@@ -12089,12 +11828,8 @@
               </a:lnSpc>
             </a:pPr>
             <a:r>
-              <a:rPr lang="en-GB" b="1" dirty="0" err="1"/>
-              <a:t>Ua.b</a:t>
-            </a:r>
-            <a:r>
-              <a:rPr lang="en-GB" dirty="0"/>
-              <a:t> unsigned fixed-point number with a integer bits and b fraction bits </a:t>
+              <a:rPr lang="en-GB" dirty="0"/>
+              <a:t>infinite repeating expansion in base 2</a:t>
             </a:r>
           </a:p>
           <a:p>
@@ -12104,87 +11839,31 @@
               </a:lnSpc>
             </a:pPr>
             <a:r>
-              <a:rPr lang="en-GB" b="1" dirty="0" err="1"/>
-              <a:t>Qa.b</a:t>
-            </a:r>
-            <a:r>
-              <a:rPr lang="en-GB" dirty="0"/>
-              <a:t> signed (two’s complement) fixed-point number with a integer bits </a:t>
-            </a:r>
-            <a:r>
-              <a:rPr lang="en-GB" i="1" dirty="0"/>
-              <a:t>b</a:t>
-            </a:r>
-            <a:r>
-              <a:rPr lang="en-GB" dirty="0"/>
-              <a:t> fractional bits</a:t>
-            </a:r>
-          </a:p>
-          <a:p>
-            <a:endParaRPr lang="en-GB" sz="800" dirty="0"/>
-          </a:p>
-          <a:p>
-            <a:r>
-              <a:rPr lang="en-GB" dirty="0"/>
-              <a:t>Commonly used in </a:t>
-            </a:r>
-            <a:r>
-              <a:rPr lang="en-GB" b="1" dirty="0"/>
-              <a:t>digital signal processing</a:t>
-            </a:r>
-            <a:r>
-              <a:rPr lang="en-GB" dirty="0"/>
-              <a:t> (DSP), </a:t>
-            </a:r>
-            <a:r>
-              <a:rPr lang="en-GB" b="1" dirty="0"/>
-              <a:t>graphics</a:t>
-            </a:r>
-            <a:r>
-              <a:rPr lang="en-GB" dirty="0"/>
-              <a:t>, and </a:t>
-            </a:r>
-            <a:r>
-              <a:rPr lang="en-GB" b="1" dirty="0"/>
-              <a:t>machine learning</a:t>
-            </a:r>
-            <a:r>
-              <a:rPr lang="en-GB" dirty="0"/>
-              <a:t> applications</a:t>
-            </a:r>
-          </a:p>
-          <a:p>
-            <a:pPr lvl="1">
+              <a:rPr lang="en-GB" dirty="0"/>
+              <a:t>just like 1/3 = 0.3333…in base 10.</a:t>
+            </a:r>
+          </a:p>
+          <a:p>
+            <a:pPr>
               <a:lnSpc>
                 <a:spcPct val="100000"/>
               </a:lnSpc>
             </a:pPr>
             <a:r>
               <a:rPr lang="en-GB" dirty="0"/>
-              <a:t>Q1.15 is the most common</a:t>
-            </a:r>
-          </a:p>
-          <a:p>
-            <a:pPr lvl="1">
-              <a:lnSpc>
-                <a:spcPct val="100000"/>
-              </a:lnSpc>
-            </a:pPr>
-            <a:r>
-              <a:rPr lang="en-GB" dirty="0"/>
-              <a:t>Q1.31 sometimes used for higher precision intermediate results</a:t>
-            </a:r>
-          </a:p>
-          <a:p>
-            <a:pPr lvl="1">
-              <a:lnSpc>
-                <a:spcPct val="100000"/>
-              </a:lnSpc>
-            </a:pPr>
-            <a:r>
-              <a:rPr lang="en-GB" dirty="0"/>
-              <a:t>U8.8 sometimes used for sensor readings</a:t>
-            </a:r>
+              <a:t>Only fractions of the form </a:t>
+            </a:r>
+            <a:r>
+              <a:rPr lang="en-GB" b="1" dirty="0"/>
+              <a:t>k/2^n </a:t>
+            </a:r>
+            <a:r>
+              <a:rPr lang="en-GB" dirty="0"/>
+              <a:t>can be represented exactly in binary</a:t>
+            </a:r>
+          </a:p>
+          <a:p>
+            <a:endParaRPr lang="en-GB" sz="500" dirty="0"/>
           </a:p>
           <a:p>
             <a:pPr marL="120650" indent="0">
@@ -12483,6 +12162,275 @@
   <p:cSld>
     <p:spTree>
       <p:nvGrpSpPr>
+        <p:cNvPr id="1" name="Shape 82">
+          <a:extLst>
+            <a:ext uri="{FF2B5EF4-FFF2-40B4-BE49-F238E27FC236}">
+              <a16:creationId xmlns:a16="http://schemas.microsoft.com/office/drawing/2014/main" id="{A0EC1221-8D69-5D1D-44DD-EA2414DEFFBC}"/>
+            </a:ext>
+          </a:extLst>
+        </p:cNvPr>
+        <p:cNvGrpSpPr/>
+        <p:nvPr/>
+      </p:nvGrpSpPr>
+      <p:grpSpPr>
+        <a:xfrm>
+          <a:off x="0" y="0"/>
+          <a:ext cx="0" cy="0"/>
+          <a:chOff x="0" y="0"/>
+          <a:chExt cx="0" cy="0"/>
+        </a:xfrm>
+      </p:grpSpPr>
+      <p:sp>
+        <p:nvSpPr>
+          <p:cNvPr id="83" name="Google Shape;83;p14">
+            <a:extLst>
+              <a:ext uri="{FF2B5EF4-FFF2-40B4-BE49-F238E27FC236}">
+                <a16:creationId xmlns:a16="http://schemas.microsoft.com/office/drawing/2014/main" id="{41A5D1EC-9D91-C4C8-0FD2-D2534FD9362F}"/>
+              </a:ext>
+            </a:extLst>
+          </p:cNvPr>
+          <p:cNvSpPr txBox="1">
+            <a:spLocks noGrp="1"/>
+          </p:cNvSpPr>
+          <p:nvPr>
+            <p:ph type="title" idx="4294967295"/>
+          </p:nvPr>
+        </p:nvSpPr>
+        <p:spPr>
+          <a:xfrm>
+            <a:off x="311700" y="421233"/>
+            <a:ext cx="8520600" cy="622500"/>
+          </a:xfrm>
+          <a:prstGeom prst="rect">
+            <a:avLst/>
+          </a:prstGeom>
+        </p:spPr>
+        <p:txBody>
+          <a:bodyPr spcFirstLastPara="1" wrap="square" lIns="91425" tIns="91425" rIns="91425" bIns="91425" anchor="b" anchorCtr="0">
+            <a:noAutofit/>
+          </a:bodyPr>
+          <a:lstStyle/>
+          <a:p>
+            <a:pPr marL="0" lvl="0" indent="0" algn="l" rtl="0">
+              <a:spcBef>
+                <a:spcPts val="0"/>
+              </a:spcBef>
+              <a:spcAft>
+                <a:spcPts val="0"/>
+              </a:spcAft>
+              <a:buNone/>
+            </a:pPr>
+            <a:r>
+              <a:rPr lang="en-GB" dirty="0"/>
+              <a:t>Fixed-Point Number Systems (2)</a:t>
+            </a:r>
+            <a:endParaRPr dirty="0"/>
+          </a:p>
+        </p:txBody>
+      </p:sp>
+      <p:sp>
+        <p:nvSpPr>
+          <p:cNvPr id="84" name="Google Shape;84;p14">
+            <a:extLst>
+              <a:ext uri="{FF2B5EF4-FFF2-40B4-BE49-F238E27FC236}">
+                <a16:creationId xmlns:a16="http://schemas.microsoft.com/office/drawing/2014/main" id="{5476FE44-C747-FD24-7A78-980E4F0B8055}"/>
+              </a:ext>
+            </a:extLst>
+          </p:cNvPr>
+          <p:cNvSpPr txBox="1">
+            <a:spLocks noGrp="1"/>
+          </p:cNvSpPr>
+          <p:nvPr>
+            <p:ph type="body" idx="1"/>
+          </p:nvPr>
+        </p:nvSpPr>
+        <p:spPr>
+          <a:xfrm>
+            <a:off x="162750" y="1192659"/>
+            <a:ext cx="8818500" cy="5387046"/>
+          </a:xfrm>
+          <a:prstGeom prst="rect">
+            <a:avLst/>
+          </a:prstGeom>
+        </p:spPr>
+        <p:txBody>
+          <a:bodyPr spcFirstLastPara="1" wrap="square" lIns="91425" tIns="91425" rIns="91425" bIns="91425" anchor="t" anchorCtr="0">
+            <a:noAutofit/>
+          </a:bodyPr>
+          <a:lstStyle/>
+          <a:p>
+            <a:r>
+              <a:rPr lang="en-GB" dirty="0"/>
+              <a:t>Notice that fixed-point numbers are </a:t>
+            </a:r>
+            <a:r>
+              <a:rPr lang="en-GB" b="1" dirty="0"/>
+              <a:t>just a collection of bits</a:t>
+            </a:r>
+            <a:endParaRPr lang="en-GB" dirty="0"/>
+          </a:p>
+          <a:p>
+            <a:pPr lvl="1">
+              <a:lnSpc>
+                <a:spcPct val="100000"/>
+              </a:lnSpc>
+            </a:pPr>
+            <a:r>
+              <a:rPr lang="en-GB" dirty="0"/>
+              <a:t>there is </a:t>
+            </a:r>
+            <a:r>
+              <a:rPr lang="en-GB" b="1" dirty="0"/>
+              <a:t>no way of knowing the existence of the binary point </a:t>
+            </a:r>
+          </a:p>
+          <a:p>
+            <a:pPr lvl="1">
+              <a:lnSpc>
+                <a:spcPct val="100000"/>
+              </a:lnSpc>
+            </a:pPr>
+            <a:r>
+              <a:rPr lang="en-GB" dirty="0"/>
+              <a:t>only through agreement of those people interpreting the number</a:t>
+            </a:r>
+          </a:p>
+          <a:p>
+            <a:r>
+              <a:rPr lang="en-GB" dirty="0"/>
+              <a:t>Standard formats </a:t>
+            </a:r>
+          </a:p>
+          <a:p>
+            <a:pPr lvl="1">
+              <a:lnSpc>
+                <a:spcPct val="100000"/>
+              </a:lnSpc>
+            </a:pPr>
+            <a:r>
+              <a:rPr lang="en-GB" b="1" dirty="0" err="1"/>
+              <a:t>Ua.b</a:t>
+            </a:r>
+            <a:r>
+              <a:rPr lang="en-GB" dirty="0"/>
+              <a:t> unsigned fixed-point number with a integer bits and b fraction bits </a:t>
+            </a:r>
+          </a:p>
+          <a:p>
+            <a:pPr lvl="1">
+              <a:lnSpc>
+                <a:spcPct val="100000"/>
+              </a:lnSpc>
+            </a:pPr>
+            <a:r>
+              <a:rPr lang="en-GB" b="1" dirty="0" err="1"/>
+              <a:t>Qa.b</a:t>
+            </a:r>
+            <a:r>
+              <a:rPr lang="en-GB" dirty="0"/>
+              <a:t> signed (two’s complement) fixed-point number with a integer bits </a:t>
+            </a:r>
+            <a:r>
+              <a:rPr lang="en-GB" i="1" dirty="0"/>
+              <a:t>b</a:t>
+            </a:r>
+            <a:r>
+              <a:rPr lang="en-GB" dirty="0"/>
+              <a:t> fractional bits</a:t>
+            </a:r>
+          </a:p>
+          <a:p>
+            <a:endParaRPr lang="en-GB" sz="800" dirty="0"/>
+          </a:p>
+          <a:p>
+            <a:r>
+              <a:rPr lang="en-GB" dirty="0"/>
+              <a:t>Commonly used in </a:t>
+            </a:r>
+            <a:r>
+              <a:rPr lang="en-GB" b="1" dirty="0"/>
+              <a:t>digital signal processing</a:t>
+            </a:r>
+            <a:r>
+              <a:rPr lang="en-GB" dirty="0"/>
+              <a:t> (DSP), </a:t>
+            </a:r>
+            <a:r>
+              <a:rPr lang="en-GB" b="1" dirty="0"/>
+              <a:t>graphics</a:t>
+            </a:r>
+            <a:r>
+              <a:rPr lang="en-GB" dirty="0"/>
+              <a:t>, and </a:t>
+            </a:r>
+            <a:r>
+              <a:rPr lang="en-GB" b="1" dirty="0"/>
+              <a:t>machine learning</a:t>
+            </a:r>
+            <a:r>
+              <a:rPr lang="en-GB" dirty="0"/>
+              <a:t> applications</a:t>
+            </a:r>
+          </a:p>
+          <a:p>
+            <a:pPr lvl="1">
+              <a:lnSpc>
+                <a:spcPct val="100000"/>
+              </a:lnSpc>
+            </a:pPr>
+            <a:r>
+              <a:rPr lang="en-GB" dirty="0"/>
+              <a:t>Q1.15 is the most common</a:t>
+            </a:r>
+          </a:p>
+          <a:p>
+            <a:pPr lvl="1">
+              <a:lnSpc>
+                <a:spcPct val="100000"/>
+              </a:lnSpc>
+            </a:pPr>
+            <a:r>
+              <a:rPr lang="en-GB" dirty="0"/>
+              <a:t>Q1.31 sometimes used for higher precision intermediate results</a:t>
+            </a:r>
+          </a:p>
+          <a:p>
+            <a:pPr lvl="1">
+              <a:lnSpc>
+                <a:spcPct val="100000"/>
+              </a:lnSpc>
+            </a:pPr>
+            <a:r>
+              <a:rPr lang="en-GB" dirty="0"/>
+              <a:t>U8.8 sometimes used for sensor readings</a:t>
+            </a:r>
+          </a:p>
+          <a:p>
+            <a:pPr marL="120650" indent="0">
+              <a:buNone/>
+            </a:pPr>
+            <a:endParaRPr lang="en-GB" dirty="0"/>
+          </a:p>
+        </p:txBody>
+      </p:sp>
+    </p:spTree>
+    <p:extLst>
+      <p:ext uri="{BB962C8B-B14F-4D97-AF65-F5344CB8AC3E}">
+        <p14:creationId xmlns:p14="http://schemas.microsoft.com/office/powerpoint/2010/main" val="1119572588"/>
+      </p:ext>
+    </p:extLst>
+  </p:cSld>
+  <p:clrMapOvr>
+    <a:masterClrMapping/>
+  </p:clrMapOvr>
+</p:sld>
+</file>
+
+<file path=ppt/slides/slide21.xml><?xml version="1.0" encoding="utf-8"?>
+<p:sld xmlns:a="http://schemas.openxmlformats.org/drawingml/2006/main" xmlns:r="http://schemas.openxmlformats.org/officeDocument/2006/relationships" xmlns:p="http://schemas.openxmlformats.org/presentationml/2006/main">
+  <p:cSld>
+    <p:spTree>
+      <p:nvGrpSpPr>
         <p:cNvPr id="1" name="Shape 82"/>
         <p:cNvGrpSpPr/>
         <p:nvPr/>
@@ -12703,7 +12651,7 @@
         </p:blipFill>
         <p:spPr>
           <a:xfrm>
-            <a:off x="667871" y="1385305"/>
+            <a:off x="667871" y="1421165"/>
             <a:ext cx="5786718" cy="1209060"/>
           </a:xfrm>
           <a:prstGeom prst="rect">
@@ -12784,7 +12732,7 @@
 </p:sld>
 </file>
 
-<file path=ppt/slides/slide21.xml><?xml version="1.0" encoding="utf-8"?>
+<file path=ppt/slides/slide22.xml><?xml version="1.0" encoding="utf-8"?>
 <p:sld xmlns:a="http://schemas.openxmlformats.org/drawingml/2006/main" xmlns:r="http://schemas.openxmlformats.org/officeDocument/2006/relationships" xmlns:p="http://schemas.openxmlformats.org/presentationml/2006/main">
   <p:cSld>
     <p:spTree>
@@ -13098,7 +13046,7 @@
 </p:sld>
 </file>
 
-<file path=ppt/slides/slide22.xml><?xml version="1.0" encoding="utf-8"?>
+<file path=ppt/slides/slide23.xml><?xml version="1.0" encoding="utf-8"?>
 <p:sld xmlns:a="http://schemas.openxmlformats.org/drawingml/2006/main" xmlns:r="http://schemas.openxmlformats.org/officeDocument/2006/relationships" xmlns:p="http://schemas.openxmlformats.org/presentationml/2006/main">
   <p:cSld>
     <p:spTree>
@@ -15803,14 +15751,14 @@
 <ds:datastoreItem xmlns:ds="http://schemas.openxmlformats.org/officeDocument/2006/customXml" ds:itemID="{F6C3D220-DD37-4202-B620-769B4D200BE0}">
   <ds:schemaRefs>
     <ds:schemaRef ds:uri="http://purl.org/dc/elements/1.1/"/>
+    <ds:schemaRef ds:uri="http://purl.org/dc/dcmitype/"/>
+    <ds:schemaRef ds:uri="http://schemas.microsoft.com/office/infopath/2007/PartnerControls"/>
     <ds:schemaRef ds:uri="http://www.w3.org/XML/1998/namespace"/>
-    <ds:schemaRef ds:uri="http://schemas.microsoft.com/office/infopath/2007/PartnerControls"/>
-    <ds:schemaRef ds:uri="3bd0d43f-5e5b-43cd-b6fc-691bd77672c6"/>
-    <ds:schemaRef ds:uri="http://purl.org/dc/dcmitype/"/>
     <ds:schemaRef ds:uri="http://schemas.microsoft.com/office/2006/documentManagement/types"/>
-    <ds:schemaRef ds:uri="http://schemas.microsoft.com/office/2006/metadata/properties"/>
     <ds:schemaRef ds:uri="http://schemas.openxmlformats.org/package/2006/metadata/core-properties"/>
     <ds:schemaRef ds:uri="e9b5433c-2372-4cb7-8bab-09518096b29b"/>
+    <ds:schemaRef ds:uri="3bd0d43f-5e5b-43cd-b6fc-691bd77672c6"/>
+    <ds:schemaRef ds:uri="http://schemas.microsoft.com/office/2006/metadata/properties"/>
     <ds:schemaRef ds:uri="http://purl.org/dc/terms/"/>
   </ds:schemaRefs>
 </ds:datastoreItem>

</xml_diff>